<commit_message>
All users admin page
</commit_message>
<xml_diff>
--- a/docs/Pycon.pptx
+++ b/docs/Pycon.pptx
@@ -7,30 +7,31 @@
   <p:sldIdLst>
     <p:sldId id="256" r:id="rId2"/>
     <p:sldId id="257" r:id="rId3"/>
-    <p:sldId id="258" r:id="rId4"/>
-    <p:sldId id="259" r:id="rId5"/>
-    <p:sldId id="267" r:id="rId6"/>
-    <p:sldId id="260" r:id="rId7"/>
-    <p:sldId id="261" r:id="rId8"/>
-    <p:sldId id="264" r:id="rId9"/>
-    <p:sldId id="262" r:id="rId10"/>
+    <p:sldId id="291" r:id="rId4"/>
+    <p:sldId id="258" r:id="rId5"/>
+    <p:sldId id="259" r:id="rId6"/>
+    <p:sldId id="282" r:id="rId7"/>
+    <p:sldId id="283" r:id="rId8"/>
+    <p:sldId id="284" r:id="rId9"/>
+    <p:sldId id="264" r:id="rId10"/>
     <p:sldId id="263" r:id="rId11"/>
-    <p:sldId id="265" r:id="rId12"/>
-    <p:sldId id="266" r:id="rId13"/>
-    <p:sldId id="268" r:id="rId14"/>
-    <p:sldId id="269" r:id="rId15"/>
-    <p:sldId id="271" r:id="rId16"/>
+    <p:sldId id="289" r:id="rId12"/>
+    <p:sldId id="285" r:id="rId13"/>
+    <p:sldId id="286" r:id="rId14"/>
+    <p:sldId id="268" r:id="rId15"/>
+    <p:sldId id="269" r:id="rId16"/>
     <p:sldId id="270" r:id="rId17"/>
     <p:sldId id="272" r:id="rId18"/>
     <p:sldId id="273" r:id="rId19"/>
-    <p:sldId id="274" r:id="rId20"/>
-    <p:sldId id="275" r:id="rId21"/>
-    <p:sldId id="276" r:id="rId22"/>
-    <p:sldId id="277" r:id="rId23"/>
+    <p:sldId id="275" r:id="rId20"/>
+    <p:sldId id="276" r:id="rId21"/>
+    <p:sldId id="288" r:id="rId22"/>
+    <p:sldId id="290" r:id="rId23"/>
     <p:sldId id="278" r:id="rId24"/>
-    <p:sldId id="279" r:id="rId25"/>
-    <p:sldId id="281" r:id="rId26"/>
-    <p:sldId id="280" r:id="rId27"/>
+    <p:sldId id="281" r:id="rId25"/>
+    <p:sldId id="292" r:id="rId26"/>
+    <p:sldId id="287" r:id="rId27"/>
+    <p:sldId id="293" r:id="rId28"/>
   </p:sldIdLst>
   <p:sldSz cx="12192000" cy="6858000"/>
   <p:notesSz cx="6858000" cy="9144000"/>
@@ -284,7 +285,7 @@
           <a:p>
             <a:fld id="{8C2B4597-0BCC-45FD-850E-31259FA2C275}" type="datetimeFigureOut">
               <a:rPr lang="ru-RU" smtClean="0"/>
-              <a:t>12.05.2020</a:t>
+              <a:t>02.09.2020</a:t>
             </a:fld>
             <a:endParaRPr lang="ru-RU"/>
           </a:p>
@@ -482,7 +483,7 @@
           <a:p>
             <a:fld id="{8C2B4597-0BCC-45FD-850E-31259FA2C275}" type="datetimeFigureOut">
               <a:rPr lang="ru-RU" smtClean="0"/>
-              <a:t>12.05.2020</a:t>
+              <a:t>02.09.2020</a:t>
             </a:fld>
             <a:endParaRPr lang="ru-RU"/>
           </a:p>
@@ -690,7 +691,7 @@
           <a:p>
             <a:fld id="{8C2B4597-0BCC-45FD-850E-31259FA2C275}" type="datetimeFigureOut">
               <a:rPr lang="ru-RU" smtClean="0"/>
-              <a:t>12.05.2020</a:t>
+              <a:t>02.09.2020</a:t>
             </a:fld>
             <a:endParaRPr lang="ru-RU"/>
           </a:p>
@@ -888,7 +889,7 @@
           <a:p>
             <a:fld id="{8C2B4597-0BCC-45FD-850E-31259FA2C275}" type="datetimeFigureOut">
               <a:rPr lang="ru-RU" smtClean="0"/>
-              <a:t>12.05.2020</a:t>
+              <a:t>02.09.2020</a:t>
             </a:fld>
             <a:endParaRPr lang="ru-RU"/>
           </a:p>
@@ -1163,7 +1164,7 @@
           <a:p>
             <a:fld id="{8C2B4597-0BCC-45FD-850E-31259FA2C275}" type="datetimeFigureOut">
               <a:rPr lang="ru-RU" smtClean="0"/>
-              <a:t>12.05.2020</a:t>
+              <a:t>02.09.2020</a:t>
             </a:fld>
             <a:endParaRPr lang="ru-RU"/>
           </a:p>
@@ -1428,7 +1429,7 @@
           <a:p>
             <a:fld id="{8C2B4597-0BCC-45FD-850E-31259FA2C275}" type="datetimeFigureOut">
               <a:rPr lang="ru-RU" smtClean="0"/>
-              <a:t>12.05.2020</a:t>
+              <a:t>02.09.2020</a:t>
             </a:fld>
             <a:endParaRPr lang="ru-RU"/>
           </a:p>
@@ -1840,7 +1841,7 @@
           <a:p>
             <a:fld id="{8C2B4597-0BCC-45FD-850E-31259FA2C275}" type="datetimeFigureOut">
               <a:rPr lang="ru-RU" smtClean="0"/>
-              <a:t>12.05.2020</a:t>
+              <a:t>02.09.2020</a:t>
             </a:fld>
             <a:endParaRPr lang="ru-RU"/>
           </a:p>
@@ -1981,7 +1982,7 @@
           <a:p>
             <a:fld id="{8C2B4597-0BCC-45FD-850E-31259FA2C275}" type="datetimeFigureOut">
               <a:rPr lang="ru-RU" smtClean="0"/>
-              <a:t>12.05.2020</a:t>
+              <a:t>02.09.2020</a:t>
             </a:fld>
             <a:endParaRPr lang="ru-RU"/>
           </a:p>
@@ -2094,7 +2095,7 @@
           <a:p>
             <a:fld id="{8C2B4597-0BCC-45FD-850E-31259FA2C275}" type="datetimeFigureOut">
               <a:rPr lang="ru-RU" smtClean="0"/>
-              <a:t>12.05.2020</a:t>
+              <a:t>02.09.2020</a:t>
             </a:fld>
             <a:endParaRPr lang="ru-RU"/>
           </a:p>
@@ -2405,7 +2406,7 @@
           <a:p>
             <a:fld id="{8C2B4597-0BCC-45FD-850E-31259FA2C275}" type="datetimeFigureOut">
               <a:rPr lang="ru-RU" smtClean="0"/>
-              <a:t>12.05.2020</a:t>
+              <a:t>02.09.2020</a:t>
             </a:fld>
             <a:endParaRPr lang="ru-RU"/>
           </a:p>
@@ -2693,7 +2694,7 @@
           <a:p>
             <a:fld id="{8C2B4597-0BCC-45FD-850E-31259FA2C275}" type="datetimeFigureOut">
               <a:rPr lang="ru-RU" smtClean="0"/>
-              <a:t>12.05.2020</a:t>
+              <a:t>02.09.2020</a:t>
             </a:fld>
             <a:endParaRPr lang="ru-RU"/>
           </a:p>
@@ -2934,7 +2935,7 @@
           <a:p>
             <a:fld id="{8C2B4597-0BCC-45FD-850E-31259FA2C275}" type="datetimeFigureOut">
               <a:rPr lang="ru-RU" smtClean="0"/>
-              <a:t>12.05.2020</a:t>
+              <a:t>02.09.2020</a:t>
             </a:fld>
             <a:endParaRPr lang="ru-RU"/>
           </a:p>
@@ -3446,7 +3447,7 @@
           <p:cNvPr id="4" name="Рисунок 3">
             <a:extLst>
               <a:ext uri="{FF2B5EF4-FFF2-40B4-BE49-F238E27FC236}">
-                <a16:creationId xmlns:a16="http://schemas.microsoft.com/office/drawing/2014/main" id="{F06DE098-4DFB-41F4-8473-8B47665C1C9F}"/>
+                <a16:creationId xmlns:a16="http://schemas.microsoft.com/office/drawing/2014/main" id="{A7537F21-6C12-4A7E-B566-18AAC2656666}"/>
               </a:ext>
             </a:extLst>
           </p:cNvPr>
@@ -3463,8 +3464,8 @@
         </p:blipFill>
         <p:spPr>
           <a:xfrm>
-            <a:off x="1262167" y="0"/>
-            <a:ext cx="9667665" cy="6858000"/>
+            <a:off x="0" y="695539"/>
+            <a:ext cx="12192000" cy="5466921"/>
           </a:xfrm>
           <a:prstGeom prst="rect">
             <a:avLst/>
@@ -3474,7 +3475,7 @@
     </p:spTree>
     <p:extLst>
       <p:ext uri="{BB962C8B-B14F-4D97-AF65-F5344CB8AC3E}">
-        <p14:creationId xmlns:p14="http://schemas.microsoft.com/office/powerpoint/2010/main" val="3192768503"/>
+        <p14:creationId xmlns:p14="http://schemas.microsoft.com/office/powerpoint/2010/main" val="2463599513"/>
       </p:ext>
     </p:extLst>
   </p:cSld>
@@ -3503,38 +3504,55 @@
       </p:grpSpPr>
       <p:pic>
         <p:nvPicPr>
-          <p:cNvPr id="4" name="Рисунок 3">
-            <a:extLst>
-              <a:ext uri="{FF2B5EF4-FFF2-40B4-BE49-F238E27FC236}">
-                <a16:creationId xmlns:a16="http://schemas.microsoft.com/office/drawing/2014/main" id="{B17660FD-E51B-4E64-8A93-E4039169A339}"/>
+          <p:cNvPr id="4098" name="Picture 2">
+            <a:extLst>
+              <a:ext uri="{FF2B5EF4-FFF2-40B4-BE49-F238E27FC236}">
+                <a16:creationId xmlns:a16="http://schemas.microsoft.com/office/drawing/2014/main" id="{19AAAF7F-2BD0-4A33-A3F7-5283CB13CEB0}"/>
               </a:ext>
             </a:extLst>
           </p:cNvPr>
           <p:cNvPicPr>
-            <a:picLocks noChangeAspect="1"/>
+            <a:picLocks noChangeAspect="1" noChangeArrowheads="1"/>
           </p:cNvPicPr>
           <p:nvPr/>
         </p:nvPicPr>
         <p:blipFill>
-          <a:blip r:embed="rId2"/>
+          <a:blip r:embed="rId2">
+            <a:extLst>
+              <a:ext uri="{28A0092B-C50C-407E-A947-70E740481C1C}">
+                <a14:useLocalDpi xmlns:a14="http://schemas.microsoft.com/office/drawing/2010/main" val="0"/>
+              </a:ext>
+            </a:extLst>
+          </a:blip>
+          <a:srcRect/>
           <a:stretch>
             <a:fillRect/>
           </a:stretch>
         </p:blipFill>
-        <p:spPr>
+        <p:spPr bwMode="auto">
           <a:xfrm>
-            <a:off x="1262167" y="0"/>
-            <a:ext cx="9667665" cy="6858000"/>
+            <a:off x="1755775" y="0"/>
+            <a:ext cx="8680450" cy="6858000"/>
           </a:xfrm>
           <a:prstGeom prst="rect">
             <a:avLst/>
           </a:prstGeom>
+          <a:noFill/>
+          <a:extLst>
+            <a:ext uri="{909E8E84-426E-40DD-AFC4-6F175D3DCCD1}">
+              <a14:hiddenFill xmlns:a14="http://schemas.microsoft.com/office/drawing/2010/main">
+                <a:solidFill>
+                  <a:srgbClr val="FFFFFF"/>
+                </a:solidFill>
+              </a14:hiddenFill>
+            </a:ext>
+          </a:extLst>
         </p:spPr>
       </p:pic>
     </p:spTree>
     <p:extLst>
       <p:ext uri="{BB962C8B-B14F-4D97-AF65-F5344CB8AC3E}">
-        <p14:creationId xmlns:p14="http://schemas.microsoft.com/office/powerpoint/2010/main" val="2282120116"/>
+        <p14:creationId xmlns:p14="http://schemas.microsoft.com/office/powerpoint/2010/main" val="3155510002"/>
       </p:ext>
     </p:extLst>
   </p:cSld>
@@ -3563,10 +3581,10 @@
       </p:grpSpPr>
       <p:pic>
         <p:nvPicPr>
-          <p:cNvPr id="5" name="Рисунок 4">
-            <a:extLst>
-              <a:ext uri="{FF2B5EF4-FFF2-40B4-BE49-F238E27FC236}">
-                <a16:creationId xmlns:a16="http://schemas.microsoft.com/office/drawing/2014/main" id="{E4F6B525-5209-422B-8612-0EA78D109E6E}"/>
+          <p:cNvPr id="4" name="Рисунок 3">
+            <a:extLst>
+              <a:ext uri="{FF2B5EF4-FFF2-40B4-BE49-F238E27FC236}">
+                <a16:creationId xmlns:a16="http://schemas.microsoft.com/office/drawing/2014/main" id="{5E48C177-8C93-4FF1-9B75-2588EE735108}"/>
               </a:ext>
             </a:extLst>
           </p:cNvPr>
@@ -3583,8 +3601,8 @@
         </p:blipFill>
         <p:spPr>
           <a:xfrm>
-            <a:off x="33679" y="0"/>
-            <a:ext cx="12124641" cy="6858000"/>
+            <a:off x="545602" y="0"/>
+            <a:ext cx="11100795" cy="6858000"/>
           </a:xfrm>
           <a:prstGeom prst="rect">
             <a:avLst/>
@@ -3594,7 +3612,7 @@
     </p:spTree>
     <p:extLst>
       <p:ext uri="{BB962C8B-B14F-4D97-AF65-F5344CB8AC3E}">
-        <p14:creationId xmlns:p14="http://schemas.microsoft.com/office/powerpoint/2010/main" val="767114493"/>
+        <p14:creationId xmlns:p14="http://schemas.microsoft.com/office/powerpoint/2010/main" val="3305293058"/>
       </p:ext>
     </p:extLst>
   </p:cSld>
@@ -3621,50 +3639,40 @@
           <a:chExt cx="0" cy="0"/>
         </a:xfrm>
       </p:grpSpPr>
-      <p:sp>
-        <p:nvSpPr>
-          <p:cNvPr id="4" name="TextBox 3">
-            <a:extLst>
-              <a:ext uri="{FF2B5EF4-FFF2-40B4-BE49-F238E27FC236}">
-                <a16:creationId xmlns:a16="http://schemas.microsoft.com/office/drawing/2014/main" id="{73B9E8D8-4FEB-4F1A-90C3-EC4DC0012F67}"/>
-              </a:ext>
-            </a:extLst>
-          </p:cNvPr>
-          <p:cNvSpPr txBox="1"/>
+      <p:pic>
+        <p:nvPicPr>
+          <p:cNvPr id="2" name="Рисунок 1">
+            <a:extLst>
+              <a:ext uri="{FF2B5EF4-FFF2-40B4-BE49-F238E27FC236}">
+                <a16:creationId xmlns:a16="http://schemas.microsoft.com/office/drawing/2014/main" id="{A8F73D74-CC21-4CCB-8672-3620BFDBA5BD}"/>
+              </a:ext>
+            </a:extLst>
+          </p:cNvPr>
+          <p:cNvPicPr>
+            <a:picLocks noChangeAspect="1"/>
+          </p:cNvPicPr>
           <p:nvPr/>
-        </p:nvSpPr>
+        </p:nvPicPr>
+        <p:blipFill>
+          <a:blip r:embed="rId2"/>
+          <a:stretch>
+            <a:fillRect/>
+          </a:stretch>
+        </p:blipFill>
         <p:spPr>
           <a:xfrm>
-            <a:off x="4107314" y="2731178"/>
-            <a:ext cx="3977371" cy="1200329"/>
+            <a:off x="0" y="740062"/>
+            <a:ext cx="12192000" cy="5377876"/>
           </a:xfrm>
           <a:prstGeom prst="rect">
             <a:avLst/>
           </a:prstGeom>
-          <a:noFill/>
         </p:spPr>
-        <p:txBody>
-          <a:bodyPr wrap="none" rtlCol="0">
-            <a:spAutoFit/>
-          </a:bodyPr>
-          <a:lstStyle/>
-          <a:p>
-            <a:r>
-              <a:rPr lang="ru-RU" sz="7200" dirty="0">
-                <a:latin typeface="Bahnschrift SemiBold" panose="020B0502040204020203" pitchFamily="34" charset="0"/>
-              </a:rPr>
-              <a:t>Админка</a:t>
-            </a:r>
-            <a:endParaRPr lang="ru-RU" dirty="0">
-              <a:latin typeface="Bahnschrift SemiBold" panose="020B0502040204020203" pitchFamily="34" charset="0"/>
-            </a:endParaRPr>
-          </a:p>
-        </p:txBody>
-      </p:sp>
+      </p:pic>
     </p:spTree>
     <p:extLst>
       <p:ext uri="{BB962C8B-B14F-4D97-AF65-F5344CB8AC3E}">
-        <p14:creationId xmlns:p14="http://schemas.microsoft.com/office/powerpoint/2010/main" val="2970634233"/>
+        <p14:creationId xmlns:p14="http://schemas.microsoft.com/office/powerpoint/2010/main" val="767114493"/>
       </p:ext>
     </p:extLst>
   </p:cSld>
@@ -3691,40 +3699,50 @@
           <a:chExt cx="0" cy="0"/>
         </a:xfrm>
       </p:grpSpPr>
-      <p:pic>
-        <p:nvPicPr>
-          <p:cNvPr id="4" name="Рисунок 3">
-            <a:extLst>
-              <a:ext uri="{FF2B5EF4-FFF2-40B4-BE49-F238E27FC236}">
-                <a16:creationId xmlns:a16="http://schemas.microsoft.com/office/drawing/2014/main" id="{A5E0D9AF-ED7C-4590-BCD6-AB5CC45C7CA9}"/>
-              </a:ext>
-            </a:extLst>
-          </p:cNvPr>
-          <p:cNvPicPr>
-            <a:picLocks noChangeAspect="1"/>
-          </p:cNvPicPr>
+      <p:sp>
+        <p:nvSpPr>
+          <p:cNvPr id="4" name="TextBox 3">
+            <a:extLst>
+              <a:ext uri="{FF2B5EF4-FFF2-40B4-BE49-F238E27FC236}">
+                <a16:creationId xmlns:a16="http://schemas.microsoft.com/office/drawing/2014/main" id="{73B9E8D8-4FEB-4F1A-90C3-EC4DC0012F67}"/>
+              </a:ext>
+            </a:extLst>
+          </p:cNvPr>
+          <p:cNvSpPr txBox="1"/>
           <p:nvPr/>
-        </p:nvPicPr>
-        <p:blipFill>
-          <a:blip r:embed="rId2"/>
-          <a:stretch>
-            <a:fillRect/>
-          </a:stretch>
-        </p:blipFill>
+        </p:nvSpPr>
         <p:spPr>
           <a:xfrm>
-            <a:off x="1514455" y="0"/>
-            <a:ext cx="9163090" cy="6858000"/>
+            <a:off x="4107314" y="2731178"/>
+            <a:ext cx="3977371" cy="1200329"/>
           </a:xfrm>
           <a:prstGeom prst="rect">
             <a:avLst/>
           </a:prstGeom>
+          <a:noFill/>
         </p:spPr>
-      </p:pic>
+        <p:txBody>
+          <a:bodyPr wrap="none" rtlCol="0">
+            <a:spAutoFit/>
+          </a:bodyPr>
+          <a:lstStyle/>
+          <a:p>
+            <a:r>
+              <a:rPr lang="ru-RU" sz="7200" dirty="0">
+                <a:latin typeface="Bahnschrift SemiBold" panose="020B0502040204020203" pitchFamily="34" charset="0"/>
+              </a:rPr>
+              <a:t>Админка</a:t>
+            </a:r>
+            <a:endParaRPr lang="ru-RU" dirty="0">
+              <a:latin typeface="Bahnschrift SemiBold" panose="020B0502040204020203" pitchFamily="34" charset="0"/>
+            </a:endParaRPr>
+          </a:p>
+        </p:txBody>
+      </p:sp>
     </p:spTree>
     <p:extLst>
       <p:ext uri="{BB962C8B-B14F-4D97-AF65-F5344CB8AC3E}">
-        <p14:creationId xmlns:p14="http://schemas.microsoft.com/office/powerpoint/2010/main" val="2011850350"/>
+        <p14:creationId xmlns:p14="http://schemas.microsoft.com/office/powerpoint/2010/main" val="2970634233"/>
       </p:ext>
     </p:extLst>
   </p:cSld>
@@ -3996,7 +4014,7 @@
           <p:cNvPr id="4" name="Рисунок 3">
             <a:extLst>
               <a:ext uri="{FF2B5EF4-FFF2-40B4-BE49-F238E27FC236}">
-                <a16:creationId xmlns:a16="http://schemas.microsoft.com/office/drawing/2014/main" id="{09600F0F-BBE7-44B8-AB19-603724B1EA84}"/>
+                <a16:creationId xmlns:a16="http://schemas.microsoft.com/office/drawing/2014/main" id="{5024785F-0429-48A5-9D7E-E5D0578DB294}"/>
               </a:ext>
             </a:extLst>
           </p:cNvPr>
@@ -4013,8 +4031,37 @@
         </p:blipFill>
         <p:spPr>
           <a:xfrm>
-            <a:off x="568141" y="0"/>
-            <a:ext cx="11055718" cy="6858000"/>
+            <a:off x="71097" y="0"/>
+            <a:ext cx="8623026" cy="6858000"/>
+          </a:xfrm>
+          <a:prstGeom prst="rect">
+            <a:avLst/>
+          </a:prstGeom>
+        </p:spPr>
+      </p:pic>
+      <p:pic>
+        <p:nvPicPr>
+          <p:cNvPr id="5" name="Рисунок 4">
+            <a:extLst>
+              <a:ext uri="{FF2B5EF4-FFF2-40B4-BE49-F238E27FC236}">
+                <a16:creationId xmlns:a16="http://schemas.microsoft.com/office/drawing/2014/main" id="{8266B6CF-912A-4FB8-94BF-40D2F7465F18}"/>
+              </a:ext>
+            </a:extLst>
+          </p:cNvPr>
+          <p:cNvPicPr>
+            <a:picLocks noChangeAspect="1"/>
+          </p:cNvPicPr>
+          <p:nvPr/>
+        </p:nvPicPr>
+        <p:blipFill rotWithShape="1">
+          <a:blip r:embed="rId3"/>
+          <a:srcRect r="36919"/>
+          <a:stretch/>
+        </p:blipFill>
+        <p:spPr>
+          <a:xfrm>
+            <a:off x="6752492" y="0"/>
+            <a:ext cx="5439508" cy="6858000"/>
           </a:xfrm>
           <a:prstGeom prst="rect">
             <a:avLst/>
@@ -4024,7 +4071,7 @@
     </p:spTree>
     <p:extLst>
       <p:ext uri="{BB962C8B-B14F-4D97-AF65-F5344CB8AC3E}">
-        <p14:creationId xmlns:p14="http://schemas.microsoft.com/office/powerpoint/2010/main" val="2976827083"/>
+        <p14:creationId xmlns:p14="http://schemas.microsoft.com/office/powerpoint/2010/main" val="2196942897"/>
       </p:ext>
     </p:extLst>
   </p:cSld>
@@ -4122,95 +4169,6 @@
           <p:cNvPr id="4" name="Рисунок 3">
             <a:extLst>
               <a:ext uri="{FF2B5EF4-FFF2-40B4-BE49-F238E27FC236}">
-                <a16:creationId xmlns:a16="http://schemas.microsoft.com/office/drawing/2014/main" id="{5024785F-0429-48A5-9D7E-E5D0578DB294}"/>
-              </a:ext>
-            </a:extLst>
-          </p:cNvPr>
-          <p:cNvPicPr>
-            <a:picLocks noChangeAspect="1"/>
-          </p:cNvPicPr>
-          <p:nvPr/>
-        </p:nvPicPr>
-        <p:blipFill>
-          <a:blip r:embed="rId2"/>
-          <a:stretch>
-            <a:fillRect/>
-          </a:stretch>
-        </p:blipFill>
-        <p:spPr>
-          <a:xfrm>
-            <a:off x="71097" y="0"/>
-            <a:ext cx="8623026" cy="6858000"/>
-          </a:xfrm>
-          <a:prstGeom prst="rect">
-            <a:avLst/>
-          </a:prstGeom>
-        </p:spPr>
-      </p:pic>
-      <p:pic>
-        <p:nvPicPr>
-          <p:cNvPr id="5" name="Рисунок 4">
-            <a:extLst>
-              <a:ext uri="{FF2B5EF4-FFF2-40B4-BE49-F238E27FC236}">
-                <a16:creationId xmlns:a16="http://schemas.microsoft.com/office/drawing/2014/main" id="{8266B6CF-912A-4FB8-94BF-40D2F7465F18}"/>
-              </a:ext>
-            </a:extLst>
-          </p:cNvPr>
-          <p:cNvPicPr>
-            <a:picLocks noChangeAspect="1"/>
-          </p:cNvPicPr>
-          <p:nvPr/>
-        </p:nvPicPr>
-        <p:blipFill rotWithShape="1">
-          <a:blip r:embed="rId3"/>
-          <a:srcRect r="36919"/>
-          <a:stretch/>
-        </p:blipFill>
-        <p:spPr>
-          <a:xfrm>
-            <a:off x="6752492" y="0"/>
-            <a:ext cx="5439508" cy="6858000"/>
-          </a:xfrm>
-          <a:prstGeom prst="rect">
-            <a:avLst/>
-          </a:prstGeom>
-        </p:spPr>
-      </p:pic>
-    </p:spTree>
-    <p:extLst>
-      <p:ext uri="{BB962C8B-B14F-4D97-AF65-F5344CB8AC3E}">
-        <p14:creationId xmlns:p14="http://schemas.microsoft.com/office/powerpoint/2010/main" val="2196942897"/>
-      </p:ext>
-    </p:extLst>
-  </p:cSld>
-  <p:clrMapOvr>
-    <a:masterClrMapping/>
-  </p:clrMapOvr>
-</p:sld>
-</file>
-
-<file path=ppt/slides/slide21.xml><?xml version="1.0" encoding="utf-8"?>
-<p:sld xmlns:a="http://schemas.openxmlformats.org/drawingml/2006/main" xmlns:r="http://schemas.openxmlformats.org/officeDocument/2006/relationships" xmlns:p="http://schemas.openxmlformats.org/presentationml/2006/main">
-  <p:cSld>
-    <p:spTree>
-      <p:nvGrpSpPr>
-        <p:cNvPr id="1" name=""/>
-        <p:cNvGrpSpPr/>
-        <p:nvPr/>
-      </p:nvGrpSpPr>
-      <p:grpSpPr>
-        <a:xfrm>
-          <a:off x="0" y="0"/>
-          <a:ext cx="0" cy="0"/>
-          <a:chOff x="0" y="0"/>
-          <a:chExt cx="0" cy="0"/>
-        </a:xfrm>
-      </p:grpSpPr>
-      <p:pic>
-        <p:nvPicPr>
-          <p:cNvPr id="4" name="Рисунок 3">
-            <a:extLst>
-              <a:ext uri="{FF2B5EF4-FFF2-40B4-BE49-F238E27FC236}">
                 <a16:creationId xmlns:a16="http://schemas.microsoft.com/office/drawing/2014/main" id="{F0C3A7B4-2883-4DB8-8A88-5024C30C3897}"/>
               </a:ext>
             </a:extLst>
@@ -4249,6 +4207,66 @@
 </p:sld>
 </file>
 
+<file path=ppt/slides/slide21.xml><?xml version="1.0" encoding="utf-8"?>
+<p:sld xmlns:a="http://schemas.openxmlformats.org/drawingml/2006/main" xmlns:r="http://schemas.openxmlformats.org/officeDocument/2006/relationships" xmlns:p="http://schemas.openxmlformats.org/presentationml/2006/main">
+  <p:cSld>
+    <p:spTree>
+      <p:nvGrpSpPr>
+        <p:cNvPr id="1" name=""/>
+        <p:cNvGrpSpPr/>
+        <p:nvPr/>
+      </p:nvGrpSpPr>
+      <p:grpSpPr>
+        <a:xfrm>
+          <a:off x="0" y="0"/>
+          <a:ext cx="0" cy="0"/>
+          <a:chOff x="0" y="0"/>
+          <a:chExt cx="0" cy="0"/>
+        </a:xfrm>
+      </p:grpSpPr>
+      <p:pic>
+        <p:nvPicPr>
+          <p:cNvPr id="4" name="Рисунок 3">
+            <a:extLst>
+              <a:ext uri="{FF2B5EF4-FFF2-40B4-BE49-F238E27FC236}">
+                <a16:creationId xmlns:a16="http://schemas.microsoft.com/office/drawing/2014/main" id="{A360FC92-9411-48D9-8BB2-C3E7F8343A5A}"/>
+              </a:ext>
+            </a:extLst>
+          </p:cNvPr>
+          <p:cNvPicPr>
+            <a:picLocks noChangeAspect="1"/>
+          </p:cNvPicPr>
+          <p:nvPr/>
+        </p:nvPicPr>
+        <p:blipFill>
+          <a:blip r:embed="rId2"/>
+          <a:stretch>
+            <a:fillRect/>
+          </a:stretch>
+        </p:blipFill>
+        <p:spPr>
+          <a:xfrm>
+            <a:off x="0" y="487194"/>
+            <a:ext cx="12192000" cy="5883611"/>
+          </a:xfrm>
+          <a:prstGeom prst="rect">
+            <a:avLst/>
+          </a:prstGeom>
+        </p:spPr>
+      </p:pic>
+    </p:spTree>
+    <p:extLst>
+      <p:ext uri="{BB962C8B-B14F-4D97-AF65-F5344CB8AC3E}">
+        <p14:creationId xmlns:p14="http://schemas.microsoft.com/office/powerpoint/2010/main" val="1811061979"/>
+      </p:ext>
+    </p:extLst>
+  </p:cSld>
+  <p:clrMapOvr>
+    <a:masterClrMapping/>
+  </p:clrMapOvr>
+</p:sld>
+</file>
+
 <file path=ppt/slides/slide22.xml><?xml version="1.0" encoding="utf-8"?>
 <p:sld xmlns:a="http://schemas.openxmlformats.org/drawingml/2006/main" xmlns:r="http://schemas.openxmlformats.org/officeDocument/2006/relationships" xmlns:p="http://schemas.openxmlformats.org/presentationml/2006/main">
   <p:cSld>
@@ -4266,25 +4284,85 @@
           <a:chExt cx="0" cy="0"/>
         </a:xfrm>
       </p:grpSpPr>
-      <p:sp>
-        <p:nvSpPr>
-          <p:cNvPr id="3" name="Объект 2">
-            <a:extLst>
-              <a:ext uri="{FF2B5EF4-FFF2-40B4-BE49-F238E27FC236}">
-                <a16:creationId xmlns:a16="http://schemas.microsoft.com/office/drawing/2014/main" id="{44738C93-C1A9-4385-A522-5FB9D17D2FA8}"/>
-              </a:ext>
-            </a:extLst>
-          </p:cNvPr>
-          <p:cNvSpPr>
-            <a:spLocks noGrp="1"/>
-          </p:cNvSpPr>
-          <p:nvPr>
-            <p:ph idx="1"/>
-          </p:nvPr>
-        </p:nvSpPr>
+      <p:pic>
+        <p:nvPicPr>
+          <p:cNvPr id="4" name="Рисунок 3">
+            <a:extLst>
+              <a:ext uri="{FF2B5EF4-FFF2-40B4-BE49-F238E27FC236}">
+                <a16:creationId xmlns:a16="http://schemas.microsoft.com/office/drawing/2014/main" id="{780D1D0A-B911-4D5B-9B0B-301C40B4C76B}"/>
+              </a:ext>
+            </a:extLst>
+          </p:cNvPr>
+          <p:cNvPicPr>
+            <a:picLocks noChangeAspect="1"/>
+          </p:cNvPicPr>
+          <p:nvPr/>
+        </p:nvPicPr>
+        <p:blipFill>
+          <a:blip r:embed="rId2"/>
+          <a:stretch>
+            <a:fillRect/>
+          </a:stretch>
+        </p:blipFill>
         <p:spPr>
           <a:xfrm>
-            <a:off x="456235" y="401939"/>
+            <a:off x="0" y="520578"/>
+            <a:ext cx="12192000" cy="5816843"/>
+          </a:xfrm>
+          <a:prstGeom prst="rect">
+            <a:avLst/>
+          </a:prstGeom>
+        </p:spPr>
+      </p:pic>
+    </p:spTree>
+    <p:extLst>
+      <p:ext uri="{BB962C8B-B14F-4D97-AF65-F5344CB8AC3E}">
+        <p14:creationId xmlns:p14="http://schemas.microsoft.com/office/powerpoint/2010/main" val="3986565169"/>
+      </p:ext>
+    </p:extLst>
+  </p:cSld>
+  <p:clrMapOvr>
+    <a:masterClrMapping/>
+  </p:clrMapOvr>
+</p:sld>
+</file>
+
+<file path=ppt/slides/slide23.xml><?xml version="1.0" encoding="utf-8"?>
+<p:sld xmlns:a="http://schemas.openxmlformats.org/drawingml/2006/main" xmlns:r="http://schemas.openxmlformats.org/officeDocument/2006/relationships" xmlns:p="http://schemas.openxmlformats.org/presentationml/2006/main">
+  <p:cSld>
+    <p:spTree>
+      <p:nvGrpSpPr>
+        <p:cNvPr id="1" name=""/>
+        <p:cNvGrpSpPr/>
+        <p:nvPr/>
+      </p:nvGrpSpPr>
+      <p:grpSpPr>
+        <a:xfrm>
+          <a:off x="0" y="0"/>
+          <a:ext cx="0" cy="0"/>
+          <a:chOff x="0" y="0"/>
+          <a:chExt cx="0" cy="0"/>
+        </a:xfrm>
+      </p:grpSpPr>
+      <p:sp>
+        <p:nvSpPr>
+          <p:cNvPr id="3" name="Объект 2">
+            <a:extLst>
+              <a:ext uri="{FF2B5EF4-FFF2-40B4-BE49-F238E27FC236}">
+                <a16:creationId xmlns:a16="http://schemas.microsoft.com/office/drawing/2014/main" id="{44738C93-C1A9-4385-A522-5FB9D17D2FA8}"/>
+              </a:ext>
+            </a:extLst>
+          </p:cNvPr>
+          <p:cNvSpPr>
+            <a:spLocks noGrp="1"/>
+          </p:cNvSpPr>
+          <p:nvPr>
+            <p:ph idx="1"/>
+          </p:nvPr>
+        </p:nvSpPr>
+        <p:spPr>
+          <a:xfrm>
+            <a:off x="838200" y="401597"/>
             <a:ext cx="10515600" cy="593484"/>
           </a:xfrm>
         </p:spPr>
@@ -4292,14 +4370,14 @@
           <a:bodyPr/>
           <a:lstStyle/>
           <a:p>
-            <a:pPr marL="0" indent="0">
+            <a:pPr marL="0" indent="0" algn="ctr">
               <a:buNone/>
             </a:pPr>
             <a:r>
               <a:rPr lang="ru-RU" dirty="0">
                 <a:latin typeface="Bahnschrift SemiBold" panose="020B0502040204020203" pitchFamily="34" charset="0"/>
               </a:rPr>
-              <a:t>Архитектура</a:t>
+              <a:t>Как всё это работает</a:t>
             </a:r>
           </a:p>
         </p:txBody>
@@ -4320,8 +4398,8 @@
         </p:nvSpPr>
         <p:spPr>
           <a:xfrm>
-            <a:off x="456235" y="1306694"/>
-            <a:ext cx="10515600" cy="2431929"/>
+            <a:off x="456235" y="1688658"/>
+            <a:ext cx="10515600" cy="5360324"/>
           </a:xfrm>
           <a:prstGeom prst="rect">
             <a:avLst/>
@@ -4501,544 +4579,6 @@
               <a:buNone/>
             </a:pPr>
             <a:r>
-              <a:rPr lang="en-US" sz="2400" dirty="0">
-                <a:latin typeface="Bahnschrift SemiLight" panose="020B0502040204020203" pitchFamily="34" charset="0"/>
-              </a:rPr>
-              <a:t>User</a:t>
-            </a:r>
-          </a:p>
-          <a:p>
-            <a:pPr marL="0" indent="0">
-              <a:buFont typeface="Arial" panose="020B0604020202020204" pitchFamily="34" charset="0"/>
-              <a:buNone/>
-            </a:pPr>
-            <a:r>
-              <a:rPr lang="en-US" sz="2400" dirty="0">
-                <a:latin typeface="Bahnschrift SemiLight" panose="020B0502040204020203" pitchFamily="34" charset="0"/>
-              </a:rPr>
-              <a:t>Problem</a:t>
-            </a:r>
-          </a:p>
-          <a:p>
-            <a:pPr marL="0" indent="0">
-              <a:buFont typeface="Arial" panose="020B0604020202020204" pitchFamily="34" charset="0"/>
-              <a:buNone/>
-            </a:pPr>
-            <a:r>
-              <a:rPr lang="en-US" sz="2400" dirty="0">
-                <a:latin typeface="Bahnschrift SemiLight" panose="020B0502040204020203" pitchFamily="34" charset="0"/>
-              </a:rPr>
-              <a:t>Submission</a:t>
-            </a:r>
-          </a:p>
-          <a:p>
-            <a:pPr marL="0" indent="0">
-              <a:buFont typeface="Arial" panose="020B0604020202020204" pitchFamily="34" charset="0"/>
-              <a:buNone/>
-            </a:pPr>
-            <a:r>
-              <a:rPr lang="en-US" sz="2400" dirty="0">
-                <a:latin typeface="Bahnschrift SemiLight" panose="020B0502040204020203" pitchFamily="34" charset="0"/>
-              </a:rPr>
-              <a:t>Test</a:t>
-            </a:r>
-          </a:p>
-          <a:p>
-            <a:pPr marL="0" indent="0">
-              <a:buFont typeface="Arial" panose="020B0604020202020204" pitchFamily="34" charset="0"/>
-              <a:buNone/>
-            </a:pPr>
-            <a:r>
-              <a:rPr lang="en-US" sz="2400" dirty="0">
-                <a:latin typeface="Bahnschrift SemiLight" panose="020B0502040204020203" pitchFamily="34" charset="0"/>
-              </a:rPr>
-              <a:t>Contest</a:t>
-            </a:r>
-          </a:p>
-        </p:txBody>
-      </p:sp>
-      <p:sp>
-        <p:nvSpPr>
-          <p:cNvPr id="6" name="Объект 2">
-            <a:extLst>
-              <a:ext uri="{FF2B5EF4-FFF2-40B4-BE49-F238E27FC236}">
-                <a16:creationId xmlns:a16="http://schemas.microsoft.com/office/drawing/2014/main" id="{496817BC-1D39-45CA-8269-4876911D7F63}"/>
-              </a:ext>
-            </a:extLst>
-          </p:cNvPr>
-          <p:cNvSpPr txBox="1">
-            <a:spLocks/>
-          </p:cNvSpPr>
-          <p:nvPr/>
-        </p:nvSpPr>
-        <p:spPr>
-          <a:xfrm>
-            <a:off x="456235" y="3727732"/>
-            <a:ext cx="10515600" cy="2431929"/>
-          </a:xfrm>
-          <a:prstGeom prst="rect">
-            <a:avLst/>
-          </a:prstGeom>
-        </p:spPr>
-        <p:txBody>
-          <a:bodyPr vert="horz" lIns="91440" tIns="45720" rIns="91440" bIns="45720" rtlCol="0">
-            <a:normAutofit/>
-          </a:bodyPr>
-          <a:lstStyle>
-            <a:lvl1pPr marL="228600" indent="-228600" algn="l" defTabSz="914400" rtl="0" eaLnBrk="1" latinLnBrk="0" hangingPunct="1">
-              <a:lnSpc>
-                <a:spcPct val="90000"/>
-              </a:lnSpc>
-              <a:spcBef>
-                <a:spcPts val="1000"/>
-              </a:spcBef>
-              <a:buFont typeface="Arial" panose="020B0604020202020204" pitchFamily="34" charset="0"/>
-              <a:buChar char="•"/>
-              <a:defRPr sz="2800" kern="1200">
-                <a:solidFill>
-                  <a:schemeClr val="tx1"/>
-                </a:solidFill>
-                <a:latin typeface="+mn-lt"/>
-                <a:ea typeface="+mn-ea"/>
-                <a:cs typeface="+mn-cs"/>
-              </a:defRPr>
-            </a:lvl1pPr>
-            <a:lvl2pPr marL="685800" indent="-228600" algn="l" defTabSz="914400" rtl="0" eaLnBrk="1" latinLnBrk="0" hangingPunct="1">
-              <a:lnSpc>
-                <a:spcPct val="90000"/>
-              </a:lnSpc>
-              <a:spcBef>
-                <a:spcPts val="500"/>
-              </a:spcBef>
-              <a:buFont typeface="Arial" panose="020B0604020202020204" pitchFamily="34" charset="0"/>
-              <a:buChar char="•"/>
-              <a:defRPr sz="2400" kern="1200">
-                <a:solidFill>
-                  <a:schemeClr val="tx1"/>
-                </a:solidFill>
-                <a:latin typeface="+mn-lt"/>
-                <a:ea typeface="+mn-ea"/>
-                <a:cs typeface="+mn-cs"/>
-              </a:defRPr>
-            </a:lvl2pPr>
-            <a:lvl3pPr marL="1143000" indent="-228600" algn="l" defTabSz="914400" rtl="0" eaLnBrk="1" latinLnBrk="0" hangingPunct="1">
-              <a:lnSpc>
-                <a:spcPct val="90000"/>
-              </a:lnSpc>
-              <a:spcBef>
-                <a:spcPts val="500"/>
-              </a:spcBef>
-              <a:buFont typeface="Arial" panose="020B0604020202020204" pitchFamily="34" charset="0"/>
-              <a:buChar char="•"/>
-              <a:defRPr sz="2000" kern="1200">
-                <a:solidFill>
-                  <a:schemeClr val="tx1"/>
-                </a:solidFill>
-                <a:latin typeface="+mn-lt"/>
-                <a:ea typeface="+mn-ea"/>
-                <a:cs typeface="+mn-cs"/>
-              </a:defRPr>
-            </a:lvl3pPr>
-            <a:lvl4pPr marL="1600200" indent="-228600" algn="l" defTabSz="914400" rtl="0" eaLnBrk="1" latinLnBrk="0" hangingPunct="1">
-              <a:lnSpc>
-                <a:spcPct val="90000"/>
-              </a:lnSpc>
-              <a:spcBef>
-                <a:spcPts val="500"/>
-              </a:spcBef>
-              <a:buFont typeface="Arial" panose="020B0604020202020204" pitchFamily="34" charset="0"/>
-              <a:buChar char="•"/>
-              <a:defRPr sz="1800" kern="1200">
-                <a:solidFill>
-                  <a:schemeClr val="tx1"/>
-                </a:solidFill>
-                <a:latin typeface="+mn-lt"/>
-                <a:ea typeface="+mn-ea"/>
-                <a:cs typeface="+mn-cs"/>
-              </a:defRPr>
-            </a:lvl4pPr>
-            <a:lvl5pPr marL="2057400" indent="-228600" algn="l" defTabSz="914400" rtl="0" eaLnBrk="1" latinLnBrk="0" hangingPunct="1">
-              <a:lnSpc>
-                <a:spcPct val="90000"/>
-              </a:lnSpc>
-              <a:spcBef>
-                <a:spcPts val="500"/>
-              </a:spcBef>
-              <a:buFont typeface="Arial" panose="020B0604020202020204" pitchFamily="34" charset="0"/>
-              <a:buChar char="•"/>
-              <a:defRPr sz="1800" kern="1200">
-                <a:solidFill>
-                  <a:schemeClr val="tx1"/>
-                </a:solidFill>
-                <a:latin typeface="+mn-lt"/>
-                <a:ea typeface="+mn-ea"/>
-                <a:cs typeface="+mn-cs"/>
-              </a:defRPr>
-            </a:lvl5pPr>
-            <a:lvl6pPr marL="2514600" indent="-228600" algn="l" defTabSz="914400" rtl="0" eaLnBrk="1" latinLnBrk="0" hangingPunct="1">
-              <a:lnSpc>
-                <a:spcPct val="90000"/>
-              </a:lnSpc>
-              <a:spcBef>
-                <a:spcPts val="500"/>
-              </a:spcBef>
-              <a:buFont typeface="Arial" panose="020B0604020202020204" pitchFamily="34" charset="0"/>
-              <a:buChar char="•"/>
-              <a:defRPr sz="1800" kern="1200">
-                <a:solidFill>
-                  <a:schemeClr val="tx1"/>
-                </a:solidFill>
-                <a:latin typeface="+mn-lt"/>
-                <a:ea typeface="+mn-ea"/>
-                <a:cs typeface="+mn-cs"/>
-              </a:defRPr>
-            </a:lvl6pPr>
-            <a:lvl7pPr marL="2971800" indent="-228600" algn="l" defTabSz="914400" rtl="0" eaLnBrk="1" latinLnBrk="0" hangingPunct="1">
-              <a:lnSpc>
-                <a:spcPct val="90000"/>
-              </a:lnSpc>
-              <a:spcBef>
-                <a:spcPts val="500"/>
-              </a:spcBef>
-              <a:buFont typeface="Arial" panose="020B0604020202020204" pitchFamily="34" charset="0"/>
-              <a:buChar char="•"/>
-              <a:defRPr sz="1800" kern="1200">
-                <a:solidFill>
-                  <a:schemeClr val="tx1"/>
-                </a:solidFill>
-                <a:latin typeface="+mn-lt"/>
-                <a:ea typeface="+mn-ea"/>
-                <a:cs typeface="+mn-cs"/>
-              </a:defRPr>
-            </a:lvl7pPr>
-            <a:lvl8pPr marL="3429000" indent="-228600" algn="l" defTabSz="914400" rtl="0" eaLnBrk="1" latinLnBrk="0" hangingPunct="1">
-              <a:lnSpc>
-                <a:spcPct val="90000"/>
-              </a:lnSpc>
-              <a:spcBef>
-                <a:spcPts val="500"/>
-              </a:spcBef>
-              <a:buFont typeface="Arial" panose="020B0604020202020204" pitchFamily="34" charset="0"/>
-              <a:buChar char="•"/>
-              <a:defRPr sz="1800" kern="1200">
-                <a:solidFill>
-                  <a:schemeClr val="tx1"/>
-                </a:solidFill>
-                <a:latin typeface="+mn-lt"/>
-                <a:ea typeface="+mn-ea"/>
-                <a:cs typeface="+mn-cs"/>
-              </a:defRPr>
-            </a:lvl8pPr>
-            <a:lvl9pPr marL="3886200" indent="-228600" algn="l" defTabSz="914400" rtl="0" eaLnBrk="1" latinLnBrk="0" hangingPunct="1">
-              <a:lnSpc>
-                <a:spcPct val="90000"/>
-              </a:lnSpc>
-              <a:spcBef>
-                <a:spcPts val="500"/>
-              </a:spcBef>
-              <a:buFont typeface="Arial" panose="020B0604020202020204" pitchFamily="34" charset="0"/>
-              <a:buChar char="•"/>
-              <a:defRPr sz="1800" kern="1200">
-                <a:solidFill>
-                  <a:schemeClr val="tx1"/>
-                </a:solidFill>
-                <a:latin typeface="+mn-lt"/>
-                <a:ea typeface="+mn-ea"/>
-                <a:cs typeface="+mn-cs"/>
-              </a:defRPr>
-            </a:lvl9pPr>
-          </a:lstStyle>
-          <a:p>
-            <a:pPr marL="0" indent="0">
-              <a:buFont typeface="Arial" panose="020B0604020202020204" pitchFamily="34" charset="0"/>
-              <a:buNone/>
-            </a:pPr>
-            <a:r>
-              <a:rPr lang="en-US" sz="2000" dirty="0">
-                <a:latin typeface="Bahnschrift Light" panose="020B0502040204020203" pitchFamily="34" charset="0"/>
-              </a:rPr>
-              <a:t>UserToProblem</a:t>
-            </a:r>
-          </a:p>
-          <a:p>
-            <a:pPr marL="0" indent="0">
-              <a:buFont typeface="Arial" panose="020B0604020202020204" pitchFamily="34" charset="0"/>
-              <a:buNone/>
-            </a:pPr>
-            <a:r>
-              <a:rPr lang="en-US" sz="2000" dirty="0">
-                <a:latin typeface="Bahnschrift Light" panose="020B0502040204020203" pitchFamily="34" charset="0"/>
-              </a:rPr>
-              <a:t>UserToContest</a:t>
-            </a:r>
-          </a:p>
-        </p:txBody>
-      </p:sp>
-    </p:spTree>
-    <p:extLst>
-      <p:ext uri="{BB962C8B-B14F-4D97-AF65-F5344CB8AC3E}">
-        <p14:creationId xmlns:p14="http://schemas.microsoft.com/office/powerpoint/2010/main" val="66767380"/>
-      </p:ext>
-    </p:extLst>
-  </p:cSld>
-  <p:clrMapOvr>
-    <a:masterClrMapping/>
-  </p:clrMapOvr>
-</p:sld>
-</file>
-
-<file path=ppt/slides/slide23.xml><?xml version="1.0" encoding="utf-8"?>
-<p:sld xmlns:a="http://schemas.openxmlformats.org/drawingml/2006/main" xmlns:r="http://schemas.openxmlformats.org/officeDocument/2006/relationships" xmlns:p="http://schemas.openxmlformats.org/presentationml/2006/main">
-  <p:cSld>
-    <p:spTree>
-      <p:nvGrpSpPr>
-        <p:cNvPr id="1" name=""/>
-        <p:cNvGrpSpPr/>
-        <p:nvPr/>
-      </p:nvGrpSpPr>
-      <p:grpSpPr>
-        <a:xfrm>
-          <a:off x="0" y="0"/>
-          <a:ext cx="0" cy="0"/>
-          <a:chOff x="0" y="0"/>
-          <a:chExt cx="0" cy="0"/>
-        </a:xfrm>
-      </p:grpSpPr>
-      <p:sp>
-        <p:nvSpPr>
-          <p:cNvPr id="3" name="Объект 2">
-            <a:extLst>
-              <a:ext uri="{FF2B5EF4-FFF2-40B4-BE49-F238E27FC236}">
-                <a16:creationId xmlns:a16="http://schemas.microsoft.com/office/drawing/2014/main" id="{44738C93-C1A9-4385-A522-5FB9D17D2FA8}"/>
-              </a:ext>
-            </a:extLst>
-          </p:cNvPr>
-          <p:cNvSpPr>
-            <a:spLocks noGrp="1"/>
-          </p:cNvSpPr>
-          <p:nvPr>
-            <p:ph idx="1"/>
-          </p:nvPr>
-        </p:nvSpPr>
-        <p:spPr>
-          <a:xfrm>
-            <a:off x="838200" y="401597"/>
-            <a:ext cx="10515600" cy="593484"/>
-          </a:xfrm>
-        </p:spPr>
-        <p:txBody>
-          <a:bodyPr/>
-          <a:lstStyle/>
-          <a:p>
-            <a:pPr marL="0" indent="0" algn="ctr">
-              <a:buNone/>
-            </a:pPr>
-            <a:r>
-              <a:rPr lang="ru-RU" dirty="0">
-                <a:latin typeface="Bahnschrift SemiBold" panose="020B0502040204020203" pitchFamily="34" charset="0"/>
-              </a:rPr>
-              <a:t>Как всё это работает</a:t>
-            </a:r>
-          </a:p>
-        </p:txBody>
-      </p:sp>
-      <p:sp>
-        <p:nvSpPr>
-          <p:cNvPr id="4" name="Объект 2">
-            <a:extLst>
-              <a:ext uri="{FF2B5EF4-FFF2-40B4-BE49-F238E27FC236}">
-                <a16:creationId xmlns:a16="http://schemas.microsoft.com/office/drawing/2014/main" id="{E23D21A5-491E-4D88-8C9C-51AA786DCC48}"/>
-              </a:ext>
-            </a:extLst>
-          </p:cNvPr>
-          <p:cNvSpPr txBox="1">
-            <a:spLocks/>
-          </p:cNvSpPr>
-          <p:nvPr/>
-        </p:nvSpPr>
-        <p:spPr>
-          <a:xfrm>
-            <a:off x="456235" y="1688658"/>
-            <a:ext cx="10515600" cy="5360324"/>
-          </a:xfrm>
-          <a:prstGeom prst="rect">
-            <a:avLst/>
-          </a:prstGeom>
-        </p:spPr>
-        <p:txBody>
-          <a:bodyPr vert="horz" lIns="91440" tIns="45720" rIns="91440" bIns="45720" rtlCol="0">
-            <a:normAutofit/>
-          </a:bodyPr>
-          <a:lstStyle>
-            <a:lvl1pPr marL="228600" indent="-228600" algn="l" defTabSz="914400" rtl="0" eaLnBrk="1" latinLnBrk="0" hangingPunct="1">
-              <a:lnSpc>
-                <a:spcPct val="90000"/>
-              </a:lnSpc>
-              <a:spcBef>
-                <a:spcPts val="1000"/>
-              </a:spcBef>
-              <a:buFont typeface="Arial" panose="020B0604020202020204" pitchFamily="34" charset="0"/>
-              <a:buChar char="•"/>
-              <a:defRPr sz="2800" kern="1200">
-                <a:solidFill>
-                  <a:schemeClr val="tx1"/>
-                </a:solidFill>
-                <a:latin typeface="+mn-lt"/>
-                <a:ea typeface="+mn-ea"/>
-                <a:cs typeface="+mn-cs"/>
-              </a:defRPr>
-            </a:lvl1pPr>
-            <a:lvl2pPr marL="685800" indent="-228600" algn="l" defTabSz="914400" rtl="0" eaLnBrk="1" latinLnBrk="0" hangingPunct="1">
-              <a:lnSpc>
-                <a:spcPct val="90000"/>
-              </a:lnSpc>
-              <a:spcBef>
-                <a:spcPts val="500"/>
-              </a:spcBef>
-              <a:buFont typeface="Arial" panose="020B0604020202020204" pitchFamily="34" charset="0"/>
-              <a:buChar char="•"/>
-              <a:defRPr sz="2400" kern="1200">
-                <a:solidFill>
-                  <a:schemeClr val="tx1"/>
-                </a:solidFill>
-                <a:latin typeface="+mn-lt"/>
-                <a:ea typeface="+mn-ea"/>
-                <a:cs typeface="+mn-cs"/>
-              </a:defRPr>
-            </a:lvl2pPr>
-            <a:lvl3pPr marL="1143000" indent="-228600" algn="l" defTabSz="914400" rtl="0" eaLnBrk="1" latinLnBrk="0" hangingPunct="1">
-              <a:lnSpc>
-                <a:spcPct val="90000"/>
-              </a:lnSpc>
-              <a:spcBef>
-                <a:spcPts val="500"/>
-              </a:spcBef>
-              <a:buFont typeface="Arial" panose="020B0604020202020204" pitchFamily="34" charset="0"/>
-              <a:buChar char="•"/>
-              <a:defRPr sz="2000" kern="1200">
-                <a:solidFill>
-                  <a:schemeClr val="tx1"/>
-                </a:solidFill>
-                <a:latin typeface="+mn-lt"/>
-                <a:ea typeface="+mn-ea"/>
-                <a:cs typeface="+mn-cs"/>
-              </a:defRPr>
-            </a:lvl3pPr>
-            <a:lvl4pPr marL="1600200" indent="-228600" algn="l" defTabSz="914400" rtl="0" eaLnBrk="1" latinLnBrk="0" hangingPunct="1">
-              <a:lnSpc>
-                <a:spcPct val="90000"/>
-              </a:lnSpc>
-              <a:spcBef>
-                <a:spcPts val="500"/>
-              </a:spcBef>
-              <a:buFont typeface="Arial" panose="020B0604020202020204" pitchFamily="34" charset="0"/>
-              <a:buChar char="•"/>
-              <a:defRPr sz="1800" kern="1200">
-                <a:solidFill>
-                  <a:schemeClr val="tx1"/>
-                </a:solidFill>
-                <a:latin typeface="+mn-lt"/>
-                <a:ea typeface="+mn-ea"/>
-                <a:cs typeface="+mn-cs"/>
-              </a:defRPr>
-            </a:lvl4pPr>
-            <a:lvl5pPr marL="2057400" indent="-228600" algn="l" defTabSz="914400" rtl="0" eaLnBrk="1" latinLnBrk="0" hangingPunct="1">
-              <a:lnSpc>
-                <a:spcPct val="90000"/>
-              </a:lnSpc>
-              <a:spcBef>
-                <a:spcPts val="500"/>
-              </a:spcBef>
-              <a:buFont typeface="Arial" panose="020B0604020202020204" pitchFamily="34" charset="0"/>
-              <a:buChar char="•"/>
-              <a:defRPr sz="1800" kern="1200">
-                <a:solidFill>
-                  <a:schemeClr val="tx1"/>
-                </a:solidFill>
-                <a:latin typeface="+mn-lt"/>
-                <a:ea typeface="+mn-ea"/>
-                <a:cs typeface="+mn-cs"/>
-              </a:defRPr>
-            </a:lvl5pPr>
-            <a:lvl6pPr marL="2514600" indent="-228600" algn="l" defTabSz="914400" rtl="0" eaLnBrk="1" latinLnBrk="0" hangingPunct="1">
-              <a:lnSpc>
-                <a:spcPct val="90000"/>
-              </a:lnSpc>
-              <a:spcBef>
-                <a:spcPts val="500"/>
-              </a:spcBef>
-              <a:buFont typeface="Arial" panose="020B0604020202020204" pitchFamily="34" charset="0"/>
-              <a:buChar char="•"/>
-              <a:defRPr sz="1800" kern="1200">
-                <a:solidFill>
-                  <a:schemeClr val="tx1"/>
-                </a:solidFill>
-                <a:latin typeface="+mn-lt"/>
-                <a:ea typeface="+mn-ea"/>
-                <a:cs typeface="+mn-cs"/>
-              </a:defRPr>
-            </a:lvl6pPr>
-            <a:lvl7pPr marL="2971800" indent="-228600" algn="l" defTabSz="914400" rtl="0" eaLnBrk="1" latinLnBrk="0" hangingPunct="1">
-              <a:lnSpc>
-                <a:spcPct val="90000"/>
-              </a:lnSpc>
-              <a:spcBef>
-                <a:spcPts val="500"/>
-              </a:spcBef>
-              <a:buFont typeface="Arial" panose="020B0604020202020204" pitchFamily="34" charset="0"/>
-              <a:buChar char="•"/>
-              <a:defRPr sz="1800" kern="1200">
-                <a:solidFill>
-                  <a:schemeClr val="tx1"/>
-                </a:solidFill>
-                <a:latin typeface="+mn-lt"/>
-                <a:ea typeface="+mn-ea"/>
-                <a:cs typeface="+mn-cs"/>
-              </a:defRPr>
-            </a:lvl7pPr>
-            <a:lvl8pPr marL="3429000" indent="-228600" algn="l" defTabSz="914400" rtl="0" eaLnBrk="1" latinLnBrk="0" hangingPunct="1">
-              <a:lnSpc>
-                <a:spcPct val="90000"/>
-              </a:lnSpc>
-              <a:spcBef>
-                <a:spcPts val="500"/>
-              </a:spcBef>
-              <a:buFont typeface="Arial" panose="020B0604020202020204" pitchFamily="34" charset="0"/>
-              <a:buChar char="•"/>
-              <a:defRPr sz="1800" kern="1200">
-                <a:solidFill>
-                  <a:schemeClr val="tx1"/>
-                </a:solidFill>
-                <a:latin typeface="+mn-lt"/>
-                <a:ea typeface="+mn-ea"/>
-                <a:cs typeface="+mn-cs"/>
-              </a:defRPr>
-            </a:lvl8pPr>
-            <a:lvl9pPr marL="3886200" indent="-228600" algn="l" defTabSz="914400" rtl="0" eaLnBrk="1" latinLnBrk="0" hangingPunct="1">
-              <a:lnSpc>
-                <a:spcPct val="90000"/>
-              </a:lnSpc>
-              <a:spcBef>
-                <a:spcPts val="500"/>
-              </a:spcBef>
-              <a:buFont typeface="Arial" panose="020B0604020202020204" pitchFamily="34" charset="0"/>
-              <a:buChar char="•"/>
-              <a:defRPr sz="1800" kern="1200">
-                <a:solidFill>
-                  <a:schemeClr val="tx1"/>
-                </a:solidFill>
-                <a:latin typeface="+mn-lt"/>
-                <a:ea typeface="+mn-ea"/>
-                <a:cs typeface="+mn-cs"/>
-              </a:defRPr>
-            </a:lvl9pPr>
-          </a:lstStyle>
-          <a:p>
-            <a:pPr marL="0" indent="0">
-              <a:buFont typeface="Arial" panose="020B0604020202020204" pitchFamily="34" charset="0"/>
-              <a:buNone/>
-            </a:pPr>
-            <a:r>
               <a:rPr lang="en-US" sz="6600" dirty="0">
                 <a:latin typeface="Bahnschrift SemiBold" panose="020B0502040204020203" pitchFamily="34" charset="0"/>
               </a:rPr>
@@ -5178,346 +4718,48 @@
       </p:grpSpPr>
       <p:sp>
         <p:nvSpPr>
-          <p:cNvPr id="3" name="Объект 2">
-            <a:extLst>
-              <a:ext uri="{FF2B5EF4-FFF2-40B4-BE49-F238E27FC236}">
-                <a16:creationId xmlns:a16="http://schemas.microsoft.com/office/drawing/2014/main" id="{44738C93-C1A9-4385-A522-5FB9D17D2FA8}"/>
-              </a:ext>
-            </a:extLst>
-          </p:cNvPr>
-          <p:cNvSpPr>
-            <a:spLocks noGrp="1"/>
-          </p:cNvSpPr>
-          <p:nvPr>
-            <p:ph idx="1"/>
-          </p:nvPr>
+          <p:cNvPr id="4" name="TextBox 3">
+            <a:extLst>
+              <a:ext uri="{FF2B5EF4-FFF2-40B4-BE49-F238E27FC236}">
+                <a16:creationId xmlns:a16="http://schemas.microsoft.com/office/drawing/2014/main" id="{73B9E8D8-4FEB-4F1A-90C3-EC4DC0012F67}"/>
+              </a:ext>
+            </a:extLst>
+          </p:cNvPr>
+          <p:cNvSpPr txBox="1"/>
+          <p:nvPr/>
         </p:nvSpPr>
         <p:spPr>
           <a:xfrm>
-            <a:off x="456235" y="401939"/>
-            <a:ext cx="10515600" cy="593484"/>
-          </a:xfrm>
-        </p:spPr>
-        <p:txBody>
-          <a:bodyPr/>
-          <a:lstStyle/>
-          <a:p>
-            <a:pPr marL="0" indent="0">
-              <a:buNone/>
-            </a:pPr>
-            <a:r>
-              <a:rPr lang="ru-RU" dirty="0">
-                <a:latin typeface="Bahnschrift SemiBold" panose="020B0502040204020203" pitchFamily="34" charset="0"/>
-              </a:rPr>
-              <a:t>Соответствие требованиям</a:t>
-            </a:r>
-          </a:p>
-        </p:txBody>
-      </p:sp>
-      <p:sp>
-        <p:nvSpPr>
-          <p:cNvPr id="4" name="Объект 2">
-            <a:extLst>
-              <a:ext uri="{FF2B5EF4-FFF2-40B4-BE49-F238E27FC236}">
-                <a16:creationId xmlns:a16="http://schemas.microsoft.com/office/drawing/2014/main" id="{E23D21A5-491E-4D88-8C9C-51AA786DCC48}"/>
-              </a:ext>
-            </a:extLst>
-          </p:cNvPr>
-          <p:cNvSpPr txBox="1">
-            <a:spLocks/>
-          </p:cNvSpPr>
-          <p:nvPr/>
-        </p:nvSpPr>
-        <p:spPr>
-          <a:xfrm>
-            <a:off x="456235" y="1306694"/>
-            <a:ext cx="10515600" cy="5395048"/>
+            <a:off x="2087531" y="2678360"/>
+            <a:ext cx="8016938" cy="1200329"/>
           </a:xfrm>
           <a:prstGeom prst="rect">
             <a:avLst/>
           </a:prstGeom>
+          <a:noFill/>
         </p:spPr>
         <p:txBody>
-          <a:bodyPr vert="horz" lIns="91440" tIns="45720" rIns="91440" bIns="45720" rtlCol="0">
-            <a:normAutofit/>
+          <a:bodyPr wrap="none" rtlCol="0">
+            <a:spAutoFit/>
           </a:bodyPr>
-          <a:lstStyle>
-            <a:lvl1pPr marL="228600" indent="-228600" algn="l" defTabSz="914400" rtl="0" eaLnBrk="1" latinLnBrk="0" hangingPunct="1">
-              <a:lnSpc>
-                <a:spcPct val="90000"/>
-              </a:lnSpc>
-              <a:spcBef>
-                <a:spcPts val="1000"/>
-              </a:spcBef>
-              <a:buFont typeface="Arial" panose="020B0604020202020204" pitchFamily="34" charset="0"/>
-              <a:buChar char="•"/>
-              <a:defRPr sz="2800" kern="1200">
-                <a:solidFill>
-                  <a:schemeClr val="tx1"/>
-                </a:solidFill>
-                <a:latin typeface="+mn-lt"/>
-                <a:ea typeface="+mn-ea"/>
-                <a:cs typeface="+mn-cs"/>
-              </a:defRPr>
-            </a:lvl1pPr>
-            <a:lvl2pPr marL="685800" indent="-228600" algn="l" defTabSz="914400" rtl="0" eaLnBrk="1" latinLnBrk="0" hangingPunct="1">
-              <a:lnSpc>
-                <a:spcPct val="90000"/>
-              </a:lnSpc>
-              <a:spcBef>
-                <a:spcPts val="500"/>
-              </a:spcBef>
-              <a:buFont typeface="Arial" panose="020B0604020202020204" pitchFamily="34" charset="0"/>
-              <a:buChar char="•"/>
-              <a:defRPr sz="2400" kern="1200">
-                <a:solidFill>
-                  <a:schemeClr val="tx1"/>
-                </a:solidFill>
-                <a:latin typeface="+mn-lt"/>
-                <a:ea typeface="+mn-ea"/>
-                <a:cs typeface="+mn-cs"/>
-              </a:defRPr>
-            </a:lvl2pPr>
-            <a:lvl3pPr marL="1143000" indent="-228600" algn="l" defTabSz="914400" rtl="0" eaLnBrk="1" latinLnBrk="0" hangingPunct="1">
-              <a:lnSpc>
-                <a:spcPct val="90000"/>
-              </a:lnSpc>
-              <a:spcBef>
-                <a:spcPts val="500"/>
-              </a:spcBef>
-              <a:buFont typeface="Arial" panose="020B0604020202020204" pitchFamily="34" charset="0"/>
-              <a:buChar char="•"/>
-              <a:defRPr sz="2000" kern="1200">
-                <a:solidFill>
-                  <a:schemeClr val="tx1"/>
-                </a:solidFill>
-                <a:latin typeface="+mn-lt"/>
-                <a:ea typeface="+mn-ea"/>
-                <a:cs typeface="+mn-cs"/>
-              </a:defRPr>
-            </a:lvl3pPr>
-            <a:lvl4pPr marL="1600200" indent="-228600" algn="l" defTabSz="914400" rtl="0" eaLnBrk="1" latinLnBrk="0" hangingPunct="1">
-              <a:lnSpc>
-                <a:spcPct val="90000"/>
-              </a:lnSpc>
-              <a:spcBef>
-                <a:spcPts val="500"/>
-              </a:spcBef>
-              <a:buFont typeface="Arial" panose="020B0604020202020204" pitchFamily="34" charset="0"/>
-              <a:buChar char="•"/>
-              <a:defRPr sz="1800" kern="1200">
-                <a:solidFill>
-                  <a:schemeClr val="tx1"/>
-                </a:solidFill>
-                <a:latin typeface="+mn-lt"/>
-                <a:ea typeface="+mn-ea"/>
-                <a:cs typeface="+mn-cs"/>
-              </a:defRPr>
-            </a:lvl4pPr>
-            <a:lvl5pPr marL="2057400" indent="-228600" algn="l" defTabSz="914400" rtl="0" eaLnBrk="1" latinLnBrk="0" hangingPunct="1">
-              <a:lnSpc>
-                <a:spcPct val="90000"/>
-              </a:lnSpc>
-              <a:spcBef>
-                <a:spcPts val="500"/>
-              </a:spcBef>
-              <a:buFont typeface="Arial" panose="020B0604020202020204" pitchFamily="34" charset="0"/>
-              <a:buChar char="•"/>
-              <a:defRPr sz="1800" kern="1200">
-                <a:solidFill>
-                  <a:schemeClr val="tx1"/>
-                </a:solidFill>
-                <a:latin typeface="+mn-lt"/>
-                <a:ea typeface="+mn-ea"/>
-                <a:cs typeface="+mn-cs"/>
-              </a:defRPr>
-            </a:lvl5pPr>
-            <a:lvl6pPr marL="2514600" indent="-228600" algn="l" defTabSz="914400" rtl="0" eaLnBrk="1" latinLnBrk="0" hangingPunct="1">
-              <a:lnSpc>
-                <a:spcPct val="90000"/>
-              </a:lnSpc>
-              <a:spcBef>
-                <a:spcPts val="500"/>
-              </a:spcBef>
-              <a:buFont typeface="Arial" panose="020B0604020202020204" pitchFamily="34" charset="0"/>
-              <a:buChar char="•"/>
-              <a:defRPr sz="1800" kern="1200">
-                <a:solidFill>
-                  <a:schemeClr val="tx1"/>
-                </a:solidFill>
-                <a:latin typeface="+mn-lt"/>
-                <a:ea typeface="+mn-ea"/>
-                <a:cs typeface="+mn-cs"/>
-              </a:defRPr>
-            </a:lvl6pPr>
-            <a:lvl7pPr marL="2971800" indent="-228600" algn="l" defTabSz="914400" rtl="0" eaLnBrk="1" latinLnBrk="0" hangingPunct="1">
-              <a:lnSpc>
-                <a:spcPct val="90000"/>
-              </a:lnSpc>
-              <a:spcBef>
-                <a:spcPts val="500"/>
-              </a:spcBef>
-              <a:buFont typeface="Arial" panose="020B0604020202020204" pitchFamily="34" charset="0"/>
-              <a:buChar char="•"/>
-              <a:defRPr sz="1800" kern="1200">
-                <a:solidFill>
-                  <a:schemeClr val="tx1"/>
-                </a:solidFill>
-                <a:latin typeface="+mn-lt"/>
-                <a:ea typeface="+mn-ea"/>
-                <a:cs typeface="+mn-cs"/>
-              </a:defRPr>
-            </a:lvl7pPr>
-            <a:lvl8pPr marL="3429000" indent="-228600" algn="l" defTabSz="914400" rtl="0" eaLnBrk="1" latinLnBrk="0" hangingPunct="1">
-              <a:lnSpc>
-                <a:spcPct val="90000"/>
-              </a:lnSpc>
-              <a:spcBef>
-                <a:spcPts val="500"/>
-              </a:spcBef>
-              <a:buFont typeface="Arial" panose="020B0604020202020204" pitchFamily="34" charset="0"/>
-              <a:buChar char="•"/>
-              <a:defRPr sz="1800" kern="1200">
-                <a:solidFill>
-                  <a:schemeClr val="tx1"/>
-                </a:solidFill>
-                <a:latin typeface="+mn-lt"/>
-                <a:ea typeface="+mn-ea"/>
-                <a:cs typeface="+mn-cs"/>
-              </a:defRPr>
-            </a:lvl8pPr>
-            <a:lvl9pPr marL="3886200" indent="-228600" algn="l" defTabSz="914400" rtl="0" eaLnBrk="1" latinLnBrk="0" hangingPunct="1">
-              <a:lnSpc>
-                <a:spcPct val="90000"/>
-              </a:lnSpc>
-              <a:spcBef>
-                <a:spcPts val="500"/>
-              </a:spcBef>
-              <a:buFont typeface="Arial" panose="020B0604020202020204" pitchFamily="34" charset="0"/>
-              <a:buChar char="•"/>
-              <a:defRPr sz="1800" kern="1200">
-                <a:solidFill>
-                  <a:schemeClr val="tx1"/>
-                </a:solidFill>
-                <a:latin typeface="+mn-lt"/>
-                <a:ea typeface="+mn-ea"/>
-                <a:cs typeface="+mn-cs"/>
-              </a:defRPr>
-            </a:lvl9pPr>
-          </a:lstStyle>
-          <a:p>
-            <a:pPr marL="0" indent="0">
-              <a:buNone/>
-            </a:pPr>
-            <a:r>
-              <a:rPr lang="en-US" sz="2400" dirty="0">
-                <a:latin typeface="Bahnschrift SemiLight" panose="020B0502040204020203" pitchFamily="34" charset="0"/>
+          <a:lstStyle/>
+          <a:p>
+            <a:r>
+              <a:rPr lang="ru-RU" sz="7200" dirty="0">
+                <a:latin typeface="Bahnschrift Light" panose="020B0502040204020203" pitchFamily="34" charset="0"/>
               </a:rPr>
-              <a:t>HTML  — 1038 </a:t>
-            </a:r>
-            <a:r>
-              <a:rPr lang="ru-RU" sz="2400" dirty="0">
-                <a:latin typeface="Bahnschrift SemiLight" panose="020B0502040204020203" pitchFamily="34" charset="0"/>
-              </a:rPr>
-              <a:t>строк.</a:t>
-            </a:r>
-            <a:endParaRPr lang="en-US" sz="2400" dirty="0">
-              <a:latin typeface="Bahnschrift SemiLight" panose="020B0502040204020203" pitchFamily="34" charset="0"/>
+              <a:t>Что будет дальше</a:t>
+            </a:r>
+            <a:endParaRPr lang="ru-RU" dirty="0">
+              <a:latin typeface="Bahnschrift Light" panose="020B0502040204020203" pitchFamily="34" charset="0"/>
             </a:endParaRPr>
-          </a:p>
-          <a:p>
-            <a:pPr marL="0" indent="0">
-              <a:buNone/>
-            </a:pPr>
-            <a:r>
-              <a:rPr lang="en-US" sz="2400" dirty="0">
-                <a:latin typeface="Bahnschrift SemiLight" panose="020B0502040204020203" pitchFamily="34" charset="0"/>
-              </a:rPr>
-              <a:t>Python — 584</a:t>
-            </a:r>
-            <a:r>
-              <a:rPr lang="ru-RU" sz="2400" dirty="0">
-                <a:latin typeface="Bahnschrift SemiLight" panose="020B0502040204020203" pitchFamily="34" charset="0"/>
-              </a:rPr>
-              <a:t> исполнительных и 325 строк моделей.</a:t>
-            </a:r>
-            <a:endParaRPr lang="en-US" sz="2400" dirty="0">
-              <a:latin typeface="Bahnschrift SemiLight" panose="020B0502040204020203" pitchFamily="34" charset="0"/>
-            </a:endParaRPr>
-          </a:p>
-          <a:p>
-            <a:pPr marL="0" indent="0">
-              <a:buNone/>
-            </a:pPr>
-            <a:r>
-              <a:rPr lang="en-US" sz="2400" dirty="0">
-                <a:latin typeface="Bahnschrift SemiLight" panose="020B0502040204020203" pitchFamily="34" charset="0"/>
-              </a:rPr>
-              <a:t>CSS — 489 </a:t>
-            </a:r>
-            <a:r>
-              <a:rPr lang="ru-RU" sz="2400" dirty="0">
-                <a:latin typeface="Bahnschrift SemiLight" panose="020B0502040204020203" pitchFamily="34" charset="0"/>
-              </a:rPr>
-              <a:t>строк.</a:t>
-            </a:r>
-          </a:p>
-          <a:p>
-            <a:pPr marL="0" indent="0">
-              <a:buNone/>
-            </a:pPr>
-            <a:endParaRPr lang="en-US" sz="2400" dirty="0">
-              <a:latin typeface="Bahnschrift SemiLight" panose="020B0502040204020203" pitchFamily="34" charset="0"/>
-            </a:endParaRPr>
-          </a:p>
-          <a:p>
-            <a:pPr marL="0" indent="0">
-              <a:buNone/>
-            </a:pPr>
-            <a:r>
-              <a:rPr lang="en-US" sz="2400" i="1" dirty="0">
-                <a:latin typeface="Bahnschrift SemiLight" panose="020B0502040204020203" pitchFamily="34" charset="0"/>
-              </a:rPr>
-              <a:t>(</a:t>
-            </a:r>
-            <a:r>
-              <a:rPr lang="ru-RU" sz="2400" i="1" dirty="0">
-                <a:latin typeface="Bahnschrift SemiLight" panose="020B0502040204020203" pitchFamily="34" charset="0"/>
-              </a:rPr>
-              <a:t>чистого и красивого кода</a:t>
-            </a:r>
-            <a:r>
-              <a:rPr lang="en-US" sz="2400" i="1" dirty="0">
-                <a:latin typeface="Bahnschrift SemiLight" panose="020B0502040204020203" pitchFamily="34" charset="0"/>
-              </a:rPr>
-              <a:t>)</a:t>
-            </a:r>
-          </a:p>
-          <a:p>
-            <a:pPr marL="0" indent="0">
-              <a:buNone/>
-            </a:pPr>
-            <a:endParaRPr lang="ru-RU" sz="2400" dirty="0">
-              <a:latin typeface="Bahnschrift SemiLight" panose="020B0502040204020203" pitchFamily="34" charset="0"/>
-            </a:endParaRPr>
-          </a:p>
-          <a:p>
-            <a:pPr marL="0" indent="0">
-              <a:buNone/>
-            </a:pPr>
-            <a:r>
-              <a:rPr lang="en-US" sz="2400" dirty="0">
-                <a:latin typeface="Bahnschrift SemiLight" panose="020B0502040204020203" pitchFamily="34" charset="0"/>
-              </a:rPr>
-              <a:t>Web, ORM.</a:t>
-            </a:r>
           </a:p>
         </p:txBody>
       </p:sp>
     </p:spTree>
     <p:extLst>
       <p:ext uri="{BB962C8B-B14F-4D97-AF65-F5344CB8AC3E}">
-        <p14:creationId xmlns:p14="http://schemas.microsoft.com/office/powerpoint/2010/main" val="1036967409"/>
+        <p14:creationId xmlns:p14="http://schemas.microsoft.com/office/powerpoint/2010/main" val="2946730053"/>
       </p:ext>
     </p:extLst>
   </p:cSld>
@@ -5558,8 +4800,8 @@
         </p:nvSpPr>
         <p:spPr>
           <a:xfrm>
-            <a:off x="2087531" y="2678360"/>
-            <a:ext cx="8016938" cy="1200329"/>
+            <a:off x="2683848" y="2580706"/>
+            <a:ext cx="6824304" cy="1200329"/>
           </a:xfrm>
           <a:prstGeom prst="rect">
             <a:avLst/>
@@ -5576,7 +4818,7 @@
               <a:rPr lang="ru-RU" sz="7200" dirty="0">
                 <a:latin typeface="Bahnschrift Light" panose="020B0502040204020203" pitchFamily="34" charset="0"/>
               </a:rPr>
-              <a:t>Что будет дальше</a:t>
+              <a:t>Использование</a:t>
             </a:r>
             <a:endParaRPr lang="ru-RU" dirty="0">
               <a:latin typeface="Bahnschrift Light" panose="020B0502040204020203" pitchFamily="34" charset="0"/>
@@ -5587,7 +4829,7 @@
     </p:spTree>
     <p:extLst>
       <p:ext uri="{BB962C8B-B14F-4D97-AF65-F5344CB8AC3E}">
-        <p14:creationId xmlns:p14="http://schemas.microsoft.com/office/powerpoint/2010/main" val="2946730053"/>
+        <p14:creationId xmlns:p14="http://schemas.microsoft.com/office/powerpoint/2010/main" val="513197541"/>
       </p:ext>
     </p:extLst>
   </p:cSld>
@@ -5628,8 +4870,8 @@
         </p:nvSpPr>
         <p:spPr>
           <a:xfrm>
-            <a:off x="2307943" y="2666785"/>
-            <a:ext cx="7576113" cy="1200329"/>
+            <a:off x="1687580" y="1728004"/>
+            <a:ext cx="8816837" cy="1200329"/>
           </a:xfrm>
           <a:prstGeom prst="rect">
             <a:avLst/>
@@ -5643,13 +4885,93 @@
           <a:lstStyle/>
           <a:p>
             <a:r>
-              <a:rPr lang="ru-RU" sz="7200" dirty="0">
-                <a:latin typeface="Bahnschrift SemiBold" panose="020B0502040204020203" pitchFamily="34" charset="0"/>
+              <a:rPr lang="en-US" sz="7200" dirty="0">
+                <a:latin typeface="Bahnschrift Light" panose="020B0502040204020203" pitchFamily="34" charset="0"/>
               </a:rPr>
-              <a:t>Спасибо, Яндекс.</a:t>
+              <a:t>pycon.mediapark.pro</a:t>
             </a:r>
             <a:endParaRPr lang="ru-RU" dirty="0">
-              <a:latin typeface="Bahnschrift SemiBold" panose="020B0502040204020203" pitchFamily="34" charset="0"/>
+              <a:latin typeface="Bahnschrift Light" panose="020B0502040204020203" pitchFamily="34" charset="0"/>
+            </a:endParaRPr>
+          </a:p>
+        </p:txBody>
+      </p:sp>
+      <p:sp>
+        <p:nvSpPr>
+          <p:cNvPr id="2" name="TextBox 1">
+            <a:extLst>
+              <a:ext uri="{FF2B5EF4-FFF2-40B4-BE49-F238E27FC236}">
+                <a16:creationId xmlns:a16="http://schemas.microsoft.com/office/drawing/2014/main" id="{63F93FE0-5873-49C2-B13C-408E232D066A}"/>
+              </a:ext>
+            </a:extLst>
+          </p:cNvPr>
+          <p:cNvSpPr txBox="1"/>
+          <p:nvPr/>
+        </p:nvSpPr>
+        <p:spPr>
+          <a:xfrm>
+            <a:off x="3180777" y="3247566"/>
+            <a:ext cx="5830442" cy="769441"/>
+          </a:xfrm>
+          <a:prstGeom prst="rect">
+            <a:avLst/>
+          </a:prstGeom>
+          <a:noFill/>
+        </p:spPr>
+        <p:txBody>
+          <a:bodyPr wrap="none" rtlCol="0">
+            <a:spAutoFit/>
+          </a:bodyPr>
+          <a:lstStyle/>
+          <a:p>
+            <a:r>
+              <a:rPr lang="en-US" sz="4400" dirty="0">
+                <a:latin typeface="Bahnschrift Light" panose="020B0502040204020203" pitchFamily="34" charset="0"/>
+              </a:rPr>
+              <a:t>adam.arut@gmail.com</a:t>
+            </a:r>
+            <a:endParaRPr lang="ru-RU" sz="1050" dirty="0">
+              <a:latin typeface="Bahnschrift Light" panose="020B0502040204020203" pitchFamily="34" charset="0"/>
+            </a:endParaRPr>
+          </a:p>
+        </p:txBody>
+      </p:sp>
+      <p:sp>
+        <p:nvSpPr>
+          <p:cNvPr id="6" name="TextBox 5">
+            <a:extLst>
+              <a:ext uri="{FF2B5EF4-FFF2-40B4-BE49-F238E27FC236}">
+                <a16:creationId xmlns:a16="http://schemas.microsoft.com/office/drawing/2014/main" id="{10BB6D70-2EA4-4069-B4E6-9460C4374ADE}"/>
+              </a:ext>
+            </a:extLst>
+          </p:cNvPr>
+          <p:cNvSpPr txBox="1"/>
+          <p:nvPr/>
+        </p:nvSpPr>
+        <p:spPr>
+          <a:xfrm>
+            <a:off x="3671296" y="4233887"/>
+            <a:ext cx="4849404" cy="769441"/>
+          </a:xfrm>
+          <a:prstGeom prst="rect">
+            <a:avLst/>
+          </a:prstGeom>
+          <a:noFill/>
+        </p:spPr>
+        <p:txBody>
+          <a:bodyPr wrap="none" rtlCol="0">
+            <a:spAutoFit/>
+          </a:bodyPr>
+          <a:lstStyle/>
+          <a:p>
+            <a:r>
+              <a:rPr lang="en-US" sz="4400" dirty="0">
+                <a:latin typeface="Bahnschrift Light" panose="020B0502040204020203" pitchFamily="34" charset="0"/>
+              </a:rPr>
+              <a:t>@adam_arutyunov</a:t>
+            </a:r>
+            <a:endParaRPr lang="ru-RU" sz="1050" dirty="0">
+              <a:latin typeface="Bahnschrift Light" panose="020B0502040204020203" pitchFamily="34" charset="0"/>
             </a:endParaRPr>
           </a:p>
         </p:txBody>
@@ -5657,7 +4979,37 @@
     </p:spTree>
     <p:extLst>
       <p:ext uri="{BB962C8B-B14F-4D97-AF65-F5344CB8AC3E}">
-        <p14:creationId xmlns:p14="http://schemas.microsoft.com/office/powerpoint/2010/main" val="3672988525"/>
+        <p14:creationId xmlns:p14="http://schemas.microsoft.com/office/powerpoint/2010/main" val="1934820691"/>
+      </p:ext>
+    </p:extLst>
+  </p:cSld>
+  <p:clrMapOvr>
+    <a:masterClrMapping/>
+  </p:clrMapOvr>
+</p:sld>
+</file>
+
+<file path=ppt/slides/slide27.xml><?xml version="1.0" encoding="utf-8"?>
+<p:sld xmlns:a="http://schemas.openxmlformats.org/drawingml/2006/main" xmlns:r="http://schemas.openxmlformats.org/officeDocument/2006/relationships" xmlns:p="http://schemas.openxmlformats.org/presentationml/2006/main">
+  <p:cSld>
+    <p:spTree>
+      <p:nvGrpSpPr>
+        <p:cNvPr id="1" name=""/>
+        <p:cNvGrpSpPr/>
+        <p:nvPr/>
+      </p:nvGrpSpPr>
+      <p:grpSpPr>
+        <a:xfrm>
+          <a:off x="0" y="0"/>
+          <a:ext cx="0" cy="0"/>
+          <a:chOff x="0" y="0"/>
+          <a:chExt cx="0" cy="0"/>
+        </a:xfrm>
+      </p:grpSpPr>
+    </p:spTree>
+    <p:extLst>
+      <p:ext uri="{BB962C8B-B14F-4D97-AF65-F5344CB8AC3E}">
+        <p14:creationId xmlns:p14="http://schemas.microsoft.com/office/powerpoint/2010/main" val="4294461131"/>
       </p:ext>
     </p:extLst>
   </p:cSld>
@@ -5684,40 +5036,50 @@
           <a:chExt cx="0" cy="0"/>
         </a:xfrm>
       </p:grpSpPr>
-      <p:pic>
-        <p:nvPicPr>
-          <p:cNvPr id="4" name="Рисунок 3">
-            <a:extLst>
-              <a:ext uri="{FF2B5EF4-FFF2-40B4-BE49-F238E27FC236}">
-                <a16:creationId xmlns:a16="http://schemas.microsoft.com/office/drawing/2014/main" id="{A44C704F-3187-4AC5-A34D-013450AC9151}"/>
-              </a:ext>
-            </a:extLst>
-          </p:cNvPr>
-          <p:cNvPicPr>
-            <a:picLocks noChangeAspect="1"/>
-          </p:cNvPicPr>
+      <p:sp>
+        <p:nvSpPr>
+          <p:cNvPr id="4" name="TextBox 3">
+            <a:extLst>
+              <a:ext uri="{FF2B5EF4-FFF2-40B4-BE49-F238E27FC236}">
+                <a16:creationId xmlns:a16="http://schemas.microsoft.com/office/drawing/2014/main" id="{73B9E8D8-4FEB-4F1A-90C3-EC4DC0012F67}"/>
+              </a:ext>
+            </a:extLst>
+          </p:cNvPr>
+          <p:cNvSpPr txBox="1"/>
           <p:nvPr/>
-        </p:nvPicPr>
-        <p:blipFill>
-          <a:blip r:embed="rId2"/>
-          <a:stretch>
-            <a:fillRect/>
-          </a:stretch>
-        </p:blipFill>
+        </p:nvSpPr>
         <p:spPr>
           <a:xfrm>
-            <a:off x="1383272" y="0"/>
-            <a:ext cx="9425455" cy="6858000"/>
+            <a:off x="3883695" y="2722301"/>
+            <a:ext cx="4424609" cy="1200329"/>
           </a:xfrm>
           <a:prstGeom prst="rect">
             <a:avLst/>
           </a:prstGeom>
+          <a:noFill/>
         </p:spPr>
-      </p:pic>
+        <p:txBody>
+          <a:bodyPr wrap="none" rtlCol="0">
+            <a:spAutoFit/>
+          </a:bodyPr>
+          <a:lstStyle/>
+          <a:p>
+            <a:r>
+              <a:rPr lang="ru-RU" sz="7200" dirty="0">
+                <a:latin typeface="Bahnschrift SemiBold" panose="020B0502040204020203" pitchFamily="34" charset="0"/>
+              </a:rPr>
+              <a:t>Проблема</a:t>
+            </a:r>
+            <a:endParaRPr lang="ru-RU" dirty="0">
+              <a:latin typeface="Bahnschrift SemiBold" panose="020B0502040204020203" pitchFamily="34" charset="0"/>
+            </a:endParaRPr>
+          </a:p>
+        </p:txBody>
+      </p:sp>
     </p:spTree>
     <p:extLst>
       <p:ext uri="{BB962C8B-B14F-4D97-AF65-F5344CB8AC3E}">
-        <p14:creationId xmlns:p14="http://schemas.microsoft.com/office/powerpoint/2010/main" val="2852935938"/>
+        <p14:creationId xmlns:p14="http://schemas.microsoft.com/office/powerpoint/2010/main" val="197061577"/>
       </p:ext>
     </p:extLst>
   </p:cSld>
@@ -5746,38 +5108,55 @@
       </p:grpSpPr>
       <p:pic>
         <p:nvPicPr>
-          <p:cNvPr id="4" name="Рисунок 3">
-            <a:extLst>
-              <a:ext uri="{FF2B5EF4-FFF2-40B4-BE49-F238E27FC236}">
-                <a16:creationId xmlns:a16="http://schemas.microsoft.com/office/drawing/2014/main" id="{B385660E-9FEB-4DDD-8CB8-B844C970F60F}"/>
+          <p:cNvPr id="1026" name="Picture 2">
+            <a:extLst>
+              <a:ext uri="{FF2B5EF4-FFF2-40B4-BE49-F238E27FC236}">
+                <a16:creationId xmlns:a16="http://schemas.microsoft.com/office/drawing/2014/main" id="{14B02C45-23E2-4EE9-8957-FAAF1F10D8F7}"/>
               </a:ext>
             </a:extLst>
           </p:cNvPr>
           <p:cNvPicPr>
-            <a:picLocks noChangeAspect="1"/>
+            <a:picLocks noChangeAspect="1" noChangeArrowheads="1"/>
           </p:cNvPicPr>
           <p:nvPr/>
         </p:nvPicPr>
         <p:blipFill>
-          <a:blip r:embed="rId2"/>
+          <a:blip r:embed="rId2">
+            <a:extLst>
+              <a:ext uri="{28A0092B-C50C-407E-A947-70E740481C1C}">
+                <a14:useLocalDpi xmlns:a14="http://schemas.microsoft.com/office/drawing/2010/main" val="0"/>
+              </a:ext>
+            </a:extLst>
+          </a:blip>
+          <a:srcRect/>
           <a:stretch>
             <a:fillRect/>
           </a:stretch>
         </p:blipFill>
-        <p:spPr>
+        <p:spPr bwMode="auto">
           <a:xfrm>
-            <a:off x="1149584" y="0"/>
-            <a:ext cx="9892832" cy="6858000"/>
+            <a:off x="1784350" y="0"/>
+            <a:ext cx="8623300" cy="6858000"/>
           </a:xfrm>
           <a:prstGeom prst="rect">
             <a:avLst/>
           </a:prstGeom>
+          <a:noFill/>
+          <a:extLst>
+            <a:ext uri="{909E8E84-426E-40DD-AFC4-6F175D3DCCD1}">
+              <a14:hiddenFill xmlns:a14="http://schemas.microsoft.com/office/drawing/2010/main">
+                <a:solidFill>
+                  <a:srgbClr val="FFFFFF"/>
+                </a:solidFill>
+              </a14:hiddenFill>
+            </a:ext>
+          </a:extLst>
         </p:spPr>
       </p:pic>
     </p:spTree>
     <p:extLst>
       <p:ext uri="{BB962C8B-B14F-4D97-AF65-F5344CB8AC3E}">
-        <p14:creationId xmlns:p14="http://schemas.microsoft.com/office/powerpoint/2010/main" val="2779184479"/>
+        <p14:creationId xmlns:p14="http://schemas.microsoft.com/office/powerpoint/2010/main" val="2852935938"/>
       </p:ext>
     </p:extLst>
   </p:cSld>
@@ -5806,38 +5185,55 @@
       </p:grpSpPr>
       <p:pic>
         <p:nvPicPr>
-          <p:cNvPr id="4" name="Рисунок 3">
-            <a:extLst>
-              <a:ext uri="{FF2B5EF4-FFF2-40B4-BE49-F238E27FC236}">
-                <a16:creationId xmlns:a16="http://schemas.microsoft.com/office/drawing/2014/main" id="{E8147C9A-E871-451E-BD1A-45E2761A52C2}"/>
+          <p:cNvPr id="2050" name="Picture 2">
+            <a:extLst>
+              <a:ext uri="{FF2B5EF4-FFF2-40B4-BE49-F238E27FC236}">
+                <a16:creationId xmlns:a16="http://schemas.microsoft.com/office/drawing/2014/main" id="{E34F333C-5D02-4381-B618-2003C3B7F3E4}"/>
               </a:ext>
             </a:extLst>
           </p:cNvPr>
           <p:cNvPicPr>
-            <a:picLocks noChangeAspect="1"/>
+            <a:picLocks noChangeAspect="1" noChangeArrowheads="1"/>
           </p:cNvPicPr>
           <p:nvPr/>
         </p:nvPicPr>
         <p:blipFill>
-          <a:blip r:embed="rId2"/>
+          <a:blip r:embed="rId2">
+            <a:extLst>
+              <a:ext uri="{28A0092B-C50C-407E-A947-70E740481C1C}">
+                <a14:useLocalDpi xmlns:a14="http://schemas.microsoft.com/office/drawing/2010/main" val="0"/>
+              </a:ext>
+            </a:extLst>
+          </a:blip>
+          <a:srcRect/>
           <a:stretch>
             <a:fillRect/>
           </a:stretch>
         </p:blipFill>
-        <p:spPr>
+        <p:spPr bwMode="auto">
           <a:xfrm>
-            <a:off x="1149584" y="0"/>
-            <a:ext cx="9892832" cy="6858000"/>
+            <a:off x="1038225" y="0"/>
+            <a:ext cx="10113963" cy="6858000"/>
           </a:xfrm>
           <a:prstGeom prst="rect">
             <a:avLst/>
           </a:prstGeom>
+          <a:noFill/>
+          <a:extLst>
+            <a:ext uri="{909E8E84-426E-40DD-AFC4-6F175D3DCCD1}">
+              <a14:hiddenFill xmlns:a14="http://schemas.microsoft.com/office/drawing/2010/main">
+                <a:solidFill>
+                  <a:srgbClr val="FFFFFF"/>
+                </a:solidFill>
+              </a14:hiddenFill>
+            </a:ext>
+          </a:extLst>
         </p:spPr>
       </p:pic>
     </p:spTree>
     <p:extLst>
       <p:ext uri="{BB962C8B-B14F-4D97-AF65-F5344CB8AC3E}">
-        <p14:creationId xmlns:p14="http://schemas.microsoft.com/office/powerpoint/2010/main" val="1889717270"/>
+        <p14:creationId xmlns:p14="http://schemas.microsoft.com/office/powerpoint/2010/main" val="2779184479"/>
       </p:ext>
     </p:extLst>
   </p:cSld>
@@ -5866,10 +5262,10 @@
       </p:grpSpPr>
       <p:pic>
         <p:nvPicPr>
-          <p:cNvPr id="5" name="Рисунок 4">
-            <a:extLst>
-              <a:ext uri="{FF2B5EF4-FFF2-40B4-BE49-F238E27FC236}">
-                <a16:creationId xmlns:a16="http://schemas.microsoft.com/office/drawing/2014/main" id="{F1FEDD2F-B5FE-4ABF-90FB-21A56CD52AD6}"/>
+          <p:cNvPr id="4" name="Рисунок 3">
+            <a:extLst>
+              <a:ext uri="{FF2B5EF4-FFF2-40B4-BE49-F238E27FC236}">
+                <a16:creationId xmlns:a16="http://schemas.microsoft.com/office/drawing/2014/main" id="{D727932C-8E40-48E3-A679-3A147A508583}"/>
               </a:ext>
             </a:extLst>
           </p:cNvPr>
@@ -5878,15 +5274,16 @@
           </p:cNvPicPr>
           <p:nvPr/>
         </p:nvPicPr>
-        <p:blipFill rotWithShape="1">
+        <p:blipFill>
           <a:blip r:embed="rId2"/>
-          <a:srcRect b="46667"/>
-          <a:stretch/>
+          <a:stretch>
+            <a:fillRect/>
+          </a:stretch>
         </p:blipFill>
         <p:spPr>
           <a:xfrm>
-            <a:off x="1421907" y="0"/>
-            <a:ext cx="9348186" cy="6494393"/>
+            <a:off x="124326" y="0"/>
+            <a:ext cx="11943347" cy="6858000"/>
           </a:xfrm>
           <a:prstGeom prst="rect">
             <a:avLst/>
@@ -5896,7 +5293,7 @@
     </p:spTree>
     <p:extLst>
       <p:ext uri="{BB962C8B-B14F-4D97-AF65-F5344CB8AC3E}">
-        <p14:creationId xmlns:p14="http://schemas.microsoft.com/office/powerpoint/2010/main" val="3974008601"/>
+        <p14:creationId xmlns:p14="http://schemas.microsoft.com/office/powerpoint/2010/main" val="968235899"/>
       </p:ext>
     </p:extLst>
   </p:cSld>
@@ -5928,7 +5325,7 @@
           <p:cNvPr id="4" name="Рисунок 3">
             <a:extLst>
               <a:ext uri="{FF2B5EF4-FFF2-40B4-BE49-F238E27FC236}">
-                <a16:creationId xmlns:a16="http://schemas.microsoft.com/office/drawing/2014/main" id="{C0CDA691-4182-40A6-B8B7-85B7208FB485}"/>
+                <a16:creationId xmlns:a16="http://schemas.microsoft.com/office/drawing/2014/main" id="{00B84C84-F372-4FAD-91DE-82660920C5A6}"/>
               </a:ext>
             </a:extLst>
           </p:cNvPr>
@@ -5937,15 +5334,46 @@
           </p:cNvPicPr>
           <p:nvPr/>
         </p:nvPicPr>
-        <p:blipFill rotWithShape="1">
+        <p:blipFill>
           <a:blip r:embed="rId2"/>
-          <a:srcRect t="51521"/>
-          <a:stretch/>
+          <a:stretch>
+            <a:fillRect/>
+          </a:stretch>
         </p:blipFill>
         <p:spPr>
           <a:xfrm>
-            <a:off x="667305" y="1678"/>
-            <a:ext cx="10857390" cy="6856322"/>
+            <a:off x="493505" y="11096"/>
+            <a:ext cx="11133971" cy="6858000"/>
+          </a:xfrm>
+          <a:prstGeom prst="rect">
+            <a:avLst/>
+          </a:prstGeom>
+        </p:spPr>
+      </p:pic>
+      <p:pic>
+        <p:nvPicPr>
+          <p:cNvPr id="5" name="Рисунок 4">
+            <a:extLst>
+              <a:ext uri="{FF2B5EF4-FFF2-40B4-BE49-F238E27FC236}">
+                <a16:creationId xmlns:a16="http://schemas.microsoft.com/office/drawing/2014/main" id="{F17A9D74-9EEB-4C29-AB68-477FC8E8B2D2}"/>
+              </a:ext>
+            </a:extLst>
+          </p:cNvPr>
+          <p:cNvPicPr>
+            <a:picLocks noChangeAspect="1"/>
+          </p:cNvPicPr>
+          <p:nvPr/>
+        </p:nvPicPr>
+        <p:blipFill>
+          <a:blip r:embed="rId3"/>
+          <a:stretch>
+            <a:fillRect/>
+          </a:stretch>
+        </p:blipFill>
+        <p:spPr>
+          <a:xfrm>
+            <a:off x="4933513" y="239696"/>
+            <a:ext cx="5591955" cy="3324689"/>
           </a:xfrm>
           <a:prstGeom prst="rect">
             <a:avLst/>
@@ -5955,7 +5383,7 @@
     </p:spTree>
     <p:extLst>
       <p:ext uri="{BB962C8B-B14F-4D97-AF65-F5344CB8AC3E}">
-        <p14:creationId xmlns:p14="http://schemas.microsoft.com/office/powerpoint/2010/main" val="603597916"/>
+        <p14:creationId xmlns:p14="http://schemas.microsoft.com/office/powerpoint/2010/main" val="2582799430"/>
       </p:ext>
     </p:extLst>
   </p:cSld>
@@ -5987,7 +5415,7 @@
           <p:cNvPr id="4" name="Рисунок 3">
             <a:extLst>
               <a:ext uri="{FF2B5EF4-FFF2-40B4-BE49-F238E27FC236}">
-                <a16:creationId xmlns:a16="http://schemas.microsoft.com/office/drawing/2014/main" id="{739A97BF-AB0B-42E8-87D8-F6C0AA96CBC5}"/>
+                <a16:creationId xmlns:a16="http://schemas.microsoft.com/office/drawing/2014/main" id="{27DA1880-83E0-4788-8761-315AD79A88F6}"/>
               </a:ext>
             </a:extLst>
           </p:cNvPr>
@@ -6004,38 +5432,8 @@
         </p:blipFill>
         <p:spPr>
           <a:xfrm>
-            <a:off x="1181265" y="826544"/>
-            <a:ext cx="3863675" cy="5204911"/>
-          </a:xfrm>
-          <a:prstGeom prst="rect">
-            <a:avLst/>
-          </a:prstGeom>
-        </p:spPr>
-      </p:pic>
-      <p:pic>
-        <p:nvPicPr>
-          <p:cNvPr id="5" name="Рисунок 4">
-            <a:extLst>
-              <a:ext uri="{FF2B5EF4-FFF2-40B4-BE49-F238E27FC236}">
-                <a16:creationId xmlns:a16="http://schemas.microsoft.com/office/drawing/2014/main" id="{895FF989-1C3E-44C6-8A57-DD72A8BD8628}"/>
-              </a:ext>
-            </a:extLst>
-          </p:cNvPr>
-          <p:cNvPicPr>
-            <a:picLocks noChangeAspect="1"/>
-          </p:cNvPicPr>
-          <p:nvPr/>
-        </p:nvPicPr>
-        <p:blipFill>
-          <a:blip r:embed="rId3"/>
-          <a:stretch>
-            <a:fillRect/>
-          </a:stretch>
-        </p:blipFill>
-        <p:spPr>
-          <a:xfrm>
-            <a:off x="6158146" y="933080"/>
-            <a:ext cx="4328535" cy="4839119"/>
+            <a:off x="0" y="503177"/>
+            <a:ext cx="12192000" cy="5851646"/>
           </a:xfrm>
           <a:prstGeom prst="rect">
             <a:avLst/>
@@ -6045,7 +5443,7 @@
     </p:spTree>
     <p:extLst>
       <p:ext uri="{BB962C8B-B14F-4D97-AF65-F5344CB8AC3E}">
-        <p14:creationId xmlns:p14="http://schemas.microsoft.com/office/powerpoint/2010/main" val="3620816159"/>
+        <p14:creationId xmlns:p14="http://schemas.microsoft.com/office/powerpoint/2010/main" val="2858618721"/>
       </p:ext>
     </p:extLst>
   </p:cSld>
@@ -6074,10 +5472,10 @@
       </p:grpSpPr>
       <p:pic>
         <p:nvPicPr>
-          <p:cNvPr id="4" name="Рисунок 3">
-            <a:extLst>
-              <a:ext uri="{FF2B5EF4-FFF2-40B4-BE49-F238E27FC236}">
-                <a16:creationId xmlns:a16="http://schemas.microsoft.com/office/drawing/2014/main" id="{2F8A8D88-B13E-453A-B99E-D8D435BDD76D}"/>
+          <p:cNvPr id="5" name="Рисунок 4">
+            <a:extLst>
+              <a:ext uri="{FF2B5EF4-FFF2-40B4-BE49-F238E27FC236}">
+                <a16:creationId xmlns:a16="http://schemas.microsoft.com/office/drawing/2014/main" id="{895FF989-1C3E-44C6-8A57-DD72A8BD8628}"/>
               </a:ext>
             </a:extLst>
           </p:cNvPr>
@@ -6094,8 +5492,38 @@
         </p:blipFill>
         <p:spPr>
           <a:xfrm>
-            <a:off x="1043291" y="0"/>
-            <a:ext cx="10105418" cy="6858000"/>
+            <a:off x="6158146" y="933080"/>
+            <a:ext cx="4328535" cy="4839119"/>
+          </a:xfrm>
+          <a:prstGeom prst="rect">
+            <a:avLst/>
+          </a:prstGeom>
+        </p:spPr>
+      </p:pic>
+      <p:pic>
+        <p:nvPicPr>
+          <p:cNvPr id="2" name="Рисунок 1">
+            <a:extLst>
+              <a:ext uri="{FF2B5EF4-FFF2-40B4-BE49-F238E27FC236}">
+                <a16:creationId xmlns:a16="http://schemas.microsoft.com/office/drawing/2014/main" id="{204D66C9-52BF-44D5-ACBA-FCECD8C7A7FE}"/>
+              </a:ext>
+            </a:extLst>
+          </p:cNvPr>
+          <p:cNvPicPr>
+            <a:picLocks noChangeAspect="1"/>
+          </p:cNvPicPr>
+          <p:nvPr/>
+        </p:nvPicPr>
+        <p:blipFill>
+          <a:blip r:embed="rId3"/>
+          <a:stretch>
+            <a:fillRect/>
+          </a:stretch>
+        </p:blipFill>
+        <p:spPr>
+          <a:xfrm>
+            <a:off x="1705319" y="410592"/>
+            <a:ext cx="3686482" cy="6036816"/>
           </a:xfrm>
           <a:prstGeom prst="rect">
             <a:avLst/>
@@ -6105,7 +5533,7 @@
     </p:spTree>
     <p:extLst>
       <p:ext uri="{BB962C8B-B14F-4D97-AF65-F5344CB8AC3E}">
-        <p14:creationId xmlns:p14="http://schemas.microsoft.com/office/powerpoint/2010/main" val="1421510199"/>
+        <p14:creationId xmlns:p14="http://schemas.microsoft.com/office/powerpoint/2010/main" val="3620816159"/>
       </p:ext>
     </p:extLst>
   </p:cSld>

</xml_diff>